<commit_message>
Literature 13 agosto 2022
</commit_message>
<xml_diff>
--- a/05_presentations/01_Primera version.pptx
+++ b/05_presentations/01_Primera version.pptx
@@ -234,7 +234,7 @@
           <a:p>
             <a:fld id="{363F6A73-3973-4936-803A-6DFC2B03047A}" type="datetimeFigureOut">
               <a:rPr lang="en-US" smtClean="0"/>
-              <a:t>8/12/2022</a:t>
+              <a:t>8/13/2022</a:t>
             </a:fld>
             <a:endParaRPr lang="en-US"/>
           </a:p>
@@ -648,7 +648,7 @@
           <a:p>
             <a:fld id="{2F167872-9E49-442C-8998-1425F3238971}" type="datetime1">
               <a:rPr lang="en-US" smtClean="0"/>
-              <a:t>8/12/2022</a:t>
+              <a:t>8/13/2022</a:t>
             </a:fld>
             <a:endParaRPr lang="en-US"/>
           </a:p>
@@ -849,7 +849,7 @@
           <a:p>
             <a:fld id="{B82BA6F8-FFCE-497D-8B3C-D46C2512E648}" type="datetime1">
               <a:rPr lang="en-US" smtClean="0"/>
-              <a:t>8/12/2022</a:t>
+              <a:t>8/13/2022</a:t>
             </a:fld>
             <a:endParaRPr lang="en-US"/>
           </a:p>
@@ -1060,7 +1060,7 @@
           <a:p>
             <a:fld id="{1D5F6967-BD2A-49B0-BB4A-C7198D22F90E}" type="datetime1">
               <a:rPr lang="en-US" smtClean="0"/>
-              <a:t>8/12/2022</a:t>
+              <a:t>8/13/2022</a:t>
             </a:fld>
             <a:endParaRPr lang="en-US"/>
           </a:p>
@@ -1261,7 +1261,7 @@
           <a:p>
             <a:fld id="{F86946B5-AA9E-4BC9-BC2B-662E85AB5295}" type="datetime1">
               <a:rPr lang="en-US" smtClean="0"/>
-              <a:t>8/12/2022</a:t>
+              <a:t>8/13/2022</a:t>
             </a:fld>
             <a:endParaRPr lang="en-US"/>
           </a:p>
@@ -1539,7 +1539,7 @@
           <a:p>
             <a:fld id="{CE95580D-9B56-411C-9B5C-98A33680CCE4}" type="datetime1">
               <a:rPr lang="en-US" smtClean="0"/>
-              <a:t>8/12/2022</a:t>
+              <a:t>8/13/2022</a:t>
             </a:fld>
             <a:endParaRPr lang="en-US"/>
           </a:p>
@@ -1807,7 +1807,7 @@
           <a:p>
             <a:fld id="{9BBF016B-A37D-402B-AA92-BBE97693D9C0}" type="datetime1">
               <a:rPr lang="en-US" smtClean="0"/>
-              <a:t>8/12/2022</a:t>
+              <a:t>8/13/2022</a:t>
             </a:fld>
             <a:endParaRPr lang="en-US"/>
           </a:p>
@@ -2222,7 +2222,7 @@
           <a:p>
             <a:fld id="{BA6F8C7C-8844-4F0D-BC1A-1D0BC12BD5C1}" type="datetime1">
               <a:rPr lang="en-US" smtClean="0"/>
-              <a:t>8/12/2022</a:t>
+              <a:t>8/13/2022</a:t>
             </a:fld>
             <a:endParaRPr lang="en-US"/>
           </a:p>
@@ -2366,7 +2366,7 @@
           <a:p>
             <a:fld id="{086F391A-A795-4AA6-928D-413F995D4033}" type="datetime1">
               <a:rPr lang="en-US" smtClean="0"/>
-              <a:t>8/12/2022</a:t>
+              <a:t>8/13/2022</a:t>
             </a:fld>
             <a:endParaRPr lang="en-US"/>
           </a:p>
@@ -2482,7 +2482,7 @@
           <a:p>
             <a:fld id="{1F951AA2-D181-4D96-830C-5F64ACA3B0CA}" type="datetime1">
               <a:rPr lang="en-US" smtClean="0"/>
-              <a:t>8/12/2022</a:t>
+              <a:t>8/13/2022</a:t>
             </a:fld>
             <a:endParaRPr lang="en-US"/>
           </a:p>
@@ -2796,7 +2796,7 @@
           <a:p>
             <a:fld id="{5FFB1AAB-856D-433D-9CC8-C5A47C2CB0C9}" type="datetime1">
               <a:rPr lang="en-US" smtClean="0"/>
-              <a:t>8/12/2022</a:t>
+              <a:t>8/13/2022</a:t>
             </a:fld>
             <a:endParaRPr lang="en-US"/>
           </a:p>
@@ -3087,7 +3087,7 @@
           <a:p>
             <a:fld id="{ADCB3FE5-8C0B-4CA9-B2C2-F5ECFE3384AC}" type="datetime1">
               <a:rPr lang="en-US" smtClean="0"/>
-              <a:t>8/12/2022</a:t>
+              <a:t>8/13/2022</a:t>
             </a:fld>
             <a:endParaRPr lang="en-US"/>
           </a:p>
@@ -3331,7 +3331,7 @@
           <a:p>
             <a:fld id="{09D98FCA-C708-4528-BCA1-15B4291C961A}" type="datetime1">
               <a:rPr lang="en-US" smtClean="0"/>
-              <a:t>8/12/2022</a:t>
+              <a:t>8/13/2022</a:t>
             </a:fld>
             <a:endParaRPr lang="en-US"/>
           </a:p>
@@ -3802,8 +3802,8 @@
         </p:nvSpPr>
         <p:spPr>
           <a:xfrm>
-            <a:off x="396241" y="0"/>
-            <a:ext cx="3962400" cy="2577629"/>
+            <a:off x="396240" y="0"/>
+            <a:ext cx="4363137" cy="2846933"/>
           </a:xfrm>
           <a:prstGeom prst="rect">
             <a:avLst/>
@@ -3821,24 +3821,28 @@
                 <a:latin typeface="Times New Roman" panose="02020603050405020304" pitchFamily="18" charset="0"/>
                 <a:cs typeface="Times New Roman" panose="02020603050405020304" pitchFamily="18" charset="0"/>
               </a:rPr>
-              <a:t>T</a:t>
+              <a:t>S</a:t>
             </a:r>
             <a:r>
               <a:rPr lang="en-US" dirty="0">
                 <a:latin typeface="Times New Roman" panose="02020603050405020304" pitchFamily="18" charset="0"/>
                 <a:cs typeface="Times New Roman" panose="02020603050405020304" pitchFamily="18" charset="0"/>
               </a:rPr>
-              <a:t>he effect of neighborhood legalization on Bogotá’s informal growth</a:t>
-            </a:r>
-          </a:p>
-          <a:p>
-            <a:r>
-              <a:rPr lang="en-US" sz="1050" dirty="0">
+              <a:t>lum recognition effects on urban informal expansion: </a:t>
+            </a:r>
+          </a:p>
+          <a:p>
+            <a:r>
+              <a:rPr lang="en-US" sz="1100" dirty="0">
                 <a:latin typeface="Times New Roman" panose="02020603050405020304" pitchFamily="18" charset="0"/>
                 <a:cs typeface="Times New Roman" panose="02020603050405020304" pitchFamily="18" charset="0"/>
               </a:rPr>
-              <a:t>An impact evaluation</a:t>
-            </a:r>
+              <a:t>An impact evaluation of the Neighborhood Legalization program in Bogotá, Colombia</a:t>
+            </a:r>
+            <a:endParaRPr lang="en-US" sz="1050" dirty="0">
+              <a:latin typeface="Times New Roman" panose="02020603050405020304" pitchFamily="18" charset="0"/>
+              <a:cs typeface="Times New Roman" panose="02020603050405020304" pitchFamily="18" charset="0"/>
+            </a:endParaRPr>
           </a:p>
           <a:p>
             <a:endParaRPr lang="en-US" sz="1050" dirty="0">

</xml_diff>

<commit_message>
Adelantos 15 de octubre
</commit_message>
<xml_diff>
--- a/05_presentations/01_Primera version.pptx
+++ b/05_presentations/01_Primera version.pptx
@@ -5,7 +5,7 @@
     <p:sldMasterId id="2147483648" r:id="rId1"/>
   </p:sldMasterIdLst>
   <p:notesMasterIdLst>
-    <p:notesMasterId r:id="rId18"/>
+    <p:notesMasterId r:id="rId21"/>
   </p:notesMasterIdLst>
   <p:sldIdLst>
     <p:sldId id="259" r:id="rId2"/>
@@ -19,11 +19,14 @@
     <p:sldId id="269" r:id="rId10"/>
     <p:sldId id="263" r:id="rId11"/>
     <p:sldId id="266" r:id="rId12"/>
-    <p:sldId id="274" r:id="rId13"/>
-    <p:sldId id="264" r:id="rId14"/>
-    <p:sldId id="265" r:id="rId15"/>
-    <p:sldId id="267" r:id="rId16"/>
-    <p:sldId id="256" r:id="rId17"/>
+    <p:sldId id="277" r:id="rId13"/>
+    <p:sldId id="276" r:id="rId14"/>
+    <p:sldId id="267" r:id="rId15"/>
+    <p:sldId id="278" r:id="rId16"/>
+    <p:sldId id="279" r:id="rId17"/>
+    <p:sldId id="264" r:id="rId18"/>
+    <p:sldId id="265" r:id="rId19"/>
+    <p:sldId id="256" r:id="rId20"/>
   </p:sldIdLst>
   <p:sldSz cx="12192000" cy="6858000"/>
   <p:notesSz cx="6858000" cy="9144000"/>
@@ -142,10 +145,13 @@
         <p14:section name="Empirical strategy" id="{143F1C10-63AC-4FC3-8BD9-2D29AD842464}">
           <p14:sldIdLst>
             <p14:sldId id="266"/>
-            <p14:sldId id="274"/>
+            <p14:sldId id="277"/>
+            <p14:sldId id="276"/>
+            <p14:sldId id="267"/>
+            <p14:sldId id="278"/>
+            <p14:sldId id="279"/>
             <p14:sldId id="264"/>
             <p14:sldId id="265"/>
-            <p14:sldId id="267"/>
             <p14:sldId id="256"/>
           </p14:sldIdLst>
         </p14:section>
@@ -240,7 +246,7 @@
           <a:p>
             <a:fld id="{363F6A73-3973-4936-803A-6DFC2B03047A}" type="datetimeFigureOut">
               <a:rPr lang="en-US" smtClean="0"/>
-              <a:t>9/15/2022</a:t>
+              <a:t>10/7/2022</a:t>
             </a:fld>
             <a:endParaRPr lang="en-US"/>
           </a:p>
@@ -654,7 +660,7 @@
           <a:p>
             <a:fld id="{2F167872-9E49-442C-8998-1425F3238971}" type="datetime1">
               <a:rPr lang="en-US" smtClean="0"/>
-              <a:t>9/15/2022</a:t>
+              <a:t>10/7/2022</a:t>
             </a:fld>
             <a:endParaRPr lang="en-US"/>
           </a:p>
@@ -855,7 +861,7 @@
           <a:p>
             <a:fld id="{B82BA6F8-FFCE-497D-8B3C-D46C2512E648}" type="datetime1">
               <a:rPr lang="en-US" smtClean="0"/>
-              <a:t>9/15/2022</a:t>
+              <a:t>10/7/2022</a:t>
             </a:fld>
             <a:endParaRPr lang="en-US"/>
           </a:p>
@@ -1066,7 +1072,7 @@
           <a:p>
             <a:fld id="{1D5F6967-BD2A-49B0-BB4A-C7198D22F90E}" type="datetime1">
               <a:rPr lang="en-US" smtClean="0"/>
-              <a:t>9/15/2022</a:t>
+              <a:t>10/7/2022</a:t>
             </a:fld>
             <a:endParaRPr lang="en-US"/>
           </a:p>
@@ -1267,7 +1273,7 @@
           <a:p>
             <a:fld id="{F86946B5-AA9E-4BC9-BC2B-662E85AB5295}" type="datetime1">
               <a:rPr lang="en-US" smtClean="0"/>
-              <a:t>9/15/2022</a:t>
+              <a:t>10/7/2022</a:t>
             </a:fld>
             <a:endParaRPr lang="en-US"/>
           </a:p>
@@ -1545,7 +1551,7 @@
           <a:p>
             <a:fld id="{CE95580D-9B56-411C-9B5C-98A33680CCE4}" type="datetime1">
               <a:rPr lang="en-US" smtClean="0"/>
-              <a:t>9/15/2022</a:t>
+              <a:t>10/7/2022</a:t>
             </a:fld>
             <a:endParaRPr lang="en-US"/>
           </a:p>
@@ -1813,7 +1819,7 @@
           <a:p>
             <a:fld id="{9BBF016B-A37D-402B-AA92-BBE97693D9C0}" type="datetime1">
               <a:rPr lang="en-US" smtClean="0"/>
-              <a:t>9/15/2022</a:t>
+              <a:t>10/7/2022</a:t>
             </a:fld>
             <a:endParaRPr lang="en-US"/>
           </a:p>
@@ -2228,7 +2234,7 @@
           <a:p>
             <a:fld id="{BA6F8C7C-8844-4F0D-BC1A-1D0BC12BD5C1}" type="datetime1">
               <a:rPr lang="en-US" smtClean="0"/>
-              <a:t>9/15/2022</a:t>
+              <a:t>10/7/2022</a:t>
             </a:fld>
             <a:endParaRPr lang="en-US"/>
           </a:p>
@@ -2372,7 +2378,7 @@
           <a:p>
             <a:fld id="{086F391A-A795-4AA6-928D-413F995D4033}" type="datetime1">
               <a:rPr lang="en-US" smtClean="0"/>
-              <a:t>9/15/2022</a:t>
+              <a:t>10/7/2022</a:t>
             </a:fld>
             <a:endParaRPr lang="en-US"/>
           </a:p>
@@ -2488,7 +2494,7 @@
           <a:p>
             <a:fld id="{1F951AA2-D181-4D96-830C-5F64ACA3B0CA}" type="datetime1">
               <a:rPr lang="en-US" smtClean="0"/>
-              <a:t>9/15/2022</a:t>
+              <a:t>10/7/2022</a:t>
             </a:fld>
             <a:endParaRPr lang="en-US"/>
           </a:p>
@@ -2802,7 +2808,7 @@
           <a:p>
             <a:fld id="{5FFB1AAB-856D-433D-9CC8-C5A47C2CB0C9}" type="datetime1">
               <a:rPr lang="en-US" smtClean="0"/>
-              <a:t>9/15/2022</a:t>
+              <a:t>10/7/2022</a:t>
             </a:fld>
             <a:endParaRPr lang="en-US"/>
           </a:p>
@@ -3093,7 +3099,7 @@
           <a:p>
             <a:fld id="{ADCB3FE5-8C0B-4CA9-B2C2-F5ECFE3384AC}" type="datetime1">
               <a:rPr lang="en-US" smtClean="0"/>
-              <a:t>9/15/2022</a:t>
+              <a:t>10/7/2022</a:t>
             </a:fld>
             <a:endParaRPr lang="en-US"/>
           </a:p>
@@ -3337,7 +3343,7 @@
           <a:p>
             <a:fld id="{09D98FCA-C708-4528-BCA1-15B4291C961A}" type="datetime1">
               <a:rPr lang="en-US" smtClean="0"/>
-              <a:t>9/15/2022</a:t>
+              <a:t>10/7/2022</a:t>
             </a:fld>
             <a:endParaRPr lang="en-US"/>
           </a:p>
@@ -4963,7 +4969,7 @@
 </file>
 
 <file path=ppt/slides/slide11.xml><?xml version="1.0" encoding="utf-8"?>
-<p:sld xmlns:a="http://schemas.openxmlformats.org/drawingml/2006/main" xmlns:r="http://schemas.openxmlformats.org/officeDocument/2006/relationships" xmlns:p="http://schemas.openxmlformats.org/presentationml/2006/main">
+<p:sld xmlns:a="http://schemas.openxmlformats.org/drawingml/2006/main" xmlns:r="http://schemas.openxmlformats.org/officeDocument/2006/relationships" xmlns:p="http://schemas.openxmlformats.org/presentationml/2006/main" show="0">
   <p:cSld>
     <p:spTree>
       <p:nvGrpSpPr>
@@ -11025,289 +11031,6 @@
           <a:chExt cx="0" cy="0"/>
         </a:xfrm>
       </p:grpSpPr>
-      <p:sp>
-        <p:nvSpPr>
-          <p:cNvPr id="2" name="TextBox 1">
-            <a:extLst>
-              <a:ext uri="{FF2B5EF4-FFF2-40B4-BE49-F238E27FC236}">
-                <a16:creationId xmlns:a16="http://schemas.microsoft.com/office/drawing/2014/main" id="{93D485E1-64D2-C2A3-A08B-26274874ACB9}"/>
-              </a:ext>
-            </a:extLst>
-          </p:cNvPr>
-          <p:cNvSpPr txBox="1"/>
-          <p:nvPr/>
-        </p:nvSpPr>
-        <p:spPr>
-          <a:xfrm>
-            <a:off x="814483" y="975360"/>
-            <a:ext cx="9087707" cy="5232202"/>
-          </a:xfrm>
-          <a:prstGeom prst="rect">
-            <a:avLst/>
-          </a:prstGeom>
-          <a:noFill/>
-        </p:spPr>
-        <p:txBody>
-          <a:bodyPr wrap="square" rtlCol="0">
-            <a:spAutoFit/>
-          </a:bodyPr>
-          <a:lstStyle/>
-          <a:p>
-            <a:r>
-              <a:rPr lang="es-ES" b="1" dirty="0">
-                <a:latin typeface="Times New Roman" panose="02020603050405020304" pitchFamily="18" charset="0"/>
-                <a:cs typeface="Times New Roman" panose="02020603050405020304" pitchFamily="18" charset="0"/>
-              </a:rPr>
-              <a:t>Preguntas</a:t>
-            </a:r>
-          </a:p>
-          <a:p>
-            <a:endParaRPr lang="es-ES" dirty="0">
-              <a:latin typeface="Times New Roman" panose="02020603050405020304" pitchFamily="18" charset="0"/>
-              <a:cs typeface="Times New Roman" panose="02020603050405020304" pitchFamily="18" charset="0"/>
-            </a:endParaRPr>
-          </a:p>
-          <a:p>
-            <a:pPr marL="342900" indent="-342900">
-              <a:buAutoNum type="arabicPeriod"/>
-            </a:pPr>
-            <a:r>
-              <a:rPr lang="es-ES" sz="1400" dirty="0">
-                <a:latin typeface="Times New Roman" panose="02020603050405020304" pitchFamily="18" charset="0"/>
-                <a:cs typeface="Times New Roman" panose="02020603050405020304" pitchFamily="18" charset="0"/>
-              </a:rPr>
-              <a:t>Definición de grupos de comparación. </a:t>
-            </a:r>
-          </a:p>
-          <a:p>
-            <a:pPr marL="342900" indent="-342900">
-              <a:buAutoNum type="arabicPeriod"/>
-            </a:pPr>
-            <a:endParaRPr lang="es-ES" sz="1400" dirty="0">
-              <a:latin typeface="Times New Roman" panose="02020603050405020304" pitchFamily="18" charset="0"/>
-              <a:cs typeface="Times New Roman" panose="02020603050405020304" pitchFamily="18" charset="0"/>
-            </a:endParaRPr>
-          </a:p>
-          <a:p>
-            <a:pPr marL="800100" lvl="1" indent="-342900">
-              <a:buFont typeface="Arial" panose="020B0604020202020204" pitchFamily="34" charset="0"/>
-              <a:buChar char="•"/>
-            </a:pPr>
-            <a:r>
-              <a:rPr lang="es-ES" sz="1400" dirty="0">
-                <a:latin typeface="Times New Roman" panose="02020603050405020304" pitchFamily="18" charset="0"/>
-                <a:cs typeface="Times New Roman" panose="02020603050405020304" pitchFamily="18" charset="0"/>
-              </a:rPr>
-              <a:t>Contaminación, anticipación y otros programas (grupos únicos o cruzados)</a:t>
-            </a:r>
-          </a:p>
-          <a:p>
-            <a:pPr lvl="1"/>
-            <a:r>
-              <a:rPr lang="es-ES" sz="1400" dirty="0">
-                <a:latin typeface="Times New Roman" panose="02020603050405020304" pitchFamily="18" charset="0"/>
-                <a:cs typeface="Times New Roman" panose="02020603050405020304" pitchFamily="18" charset="0"/>
-              </a:rPr>
-              <a:t>		</a:t>
-            </a:r>
-          </a:p>
-          <a:p>
-            <a:pPr lvl="1"/>
-            <a:endParaRPr lang="es-ES" sz="1400" dirty="0">
-              <a:latin typeface="Times New Roman" panose="02020603050405020304" pitchFamily="18" charset="0"/>
-              <a:cs typeface="Times New Roman" panose="02020603050405020304" pitchFamily="18" charset="0"/>
-            </a:endParaRPr>
-          </a:p>
-          <a:p>
-            <a:pPr lvl="1"/>
-            <a:endParaRPr lang="es-ES" sz="1400" dirty="0">
-              <a:latin typeface="Times New Roman" panose="02020603050405020304" pitchFamily="18" charset="0"/>
-              <a:cs typeface="Times New Roman" panose="02020603050405020304" pitchFamily="18" charset="0"/>
-            </a:endParaRPr>
-          </a:p>
-          <a:p>
-            <a:pPr lvl="1"/>
-            <a:endParaRPr lang="es-ES" sz="1400" dirty="0">
-              <a:latin typeface="Times New Roman" panose="02020603050405020304" pitchFamily="18" charset="0"/>
-              <a:cs typeface="Times New Roman" panose="02020603050405020304" pitchFamily="18" charset="0"/>
-            </a:endParaRPr>
-          </a:p>
-          <a:p>
-            <a:pPr lvl="1"/>
-            <a:endParaRPr lang="es-ES" sz="1400" dirty="0">
-              <a:latin typeface="Times New Roman" panose="02020603050405020304" pitchFamily="18" charset="0"/>
-              <a:cs typeface="Times New Roman" panose="02020603050405020304" pitchFamily="18" charset="0"/>
-            </a:endParaRPr>
-          </a:p>
-          <a:p>
-            <a:pPr lvl="1"/>
-            <a:endParaRPr lang="es-ES" sz="1400" dirty="0">
-              <a:latin typeface="Times New Roman" panose="02020603050405020304" pitchFamily="18" charset="0"/>
-              <a:cs typeface="Times New Roman" panose="02020603050405020304" pitchFamily="18" charset="0"/>
-            </a:endParaRPr>
-          </a:p>
-          <a:p>
-            <a:pPr marL="342900" indent="-342900">
-              <a:buFont typeface="+mj-lt"/>
-              <a:buAutoNum type="arabicPeriod"/>
-            </a:pPr>
-            <a:endParaRPr lang="es-ES" sz="1400" dirty="0">
-              <a:latin typeface="Times New Roman" panose="02020603050405020304" pitchFamily="18" charset="0"/>
-              <a:cs typeface="Times New Roman" panose="02020603050405020304" pitchFamily="18" charset="0"/>
-            </a:endParaRPr>
-          </a:p>
-          <a:p>
-            <a:pPr marL="342900" indent="-342900">
-              <a:buFont typeface="+mj-lt"/>
-              <a:buAutoNum type="arabicPeriod"/>
-            </a:pPr>
-            <a:endParaRPr lang="es-ES" sz="1400" dirty="0">
-              <a:latin typeface="Times New Roman" panose="02020603050405020304" pitchFamily="18" charset="0"/>
-              <a:cs typeface="Times New Roman" panose="02020603050405020304" pitchFamily="18" charset="0"/>
-            </a:endParaRPr>
-          </a:p>
-          <a:p>
-            <a:pPr marL="342900" indent="-342900">
-              <a:buFont typeface="+mj-lt"/>
-              <a:buAutoNum type="arabicPeriod"/>
-            </a:pPr>
-            <a:r>
-              <a:rPr lang="es-ES" sz="1400" dirty="0">
-                <a:latin typeface="Times New Roman" panose="02020603050405020304" pitchFamily="18" charset="0"/>
-                <a:cs typeface="Times New Roman" panose="02020603050405020304" pitchFamily="18" charset="0"/>
-              </a:rPr>
-              <a:t>Tipología de las variables del PS (pueden entrar time-</a:t>
-            </a:r>
-            <a:r>
-              <a:rPr lang="es-ES" sz="1400" dirty="0" err="1">
-                <a:latin typeface="Times New Roman" panose="02020603050405020304" pitchFamily="18" charset="0"/>
-                <a:cs typeface="Times New Roman" panose="02020603050405020304" pitchFamily="18" charset="0"/>
-              </a:rPr>
-              <a:t>invariants</a:t>
-            </a:r>
-            <a:r>
-              <a:rPr lang="es-ES" sz="1400" dirty="0">
-                <a:latin typeface="Times New Roman" panose="02020603050405020304" pitchFamily="18" charset="0"/>
-                <a:cs typeface="Times New Roman" panose="02020603050405020304" pitchFamily="18" charset="0"/>
-              </a:rPr>
-              <a:t>, son varios PS o solo uno general)</a:t>
-            </a:r>
-          </a:p>
-          <a:p>
-            <a:pPr marL="342900" indent="-342900">
-              <a:buFont typeface="+mj-lt"/>
-              <a:buAutoNum type="arabicPeriod"/>
-            </a:pPr>
-            <a:endParaRPr lang="es-ES" sz="1400" dirty="0">
-              <a:latin typeface="Times New Roman" panose="02020603050405020304" pitchFamily="18" charset="0"/>
-              <a:cs typeface="Times New Roman" panose="02020603050405020304" pitchFamily="18" charset="0"/>
-            </a:endParaRPr>
-          </a:p>
-          <a:p>
-            <a:pPr marL="342900" indent="-342900">
-              <a:buFont typeface="+mj-lt"/>
-              <a:buAutoNum type="arabicPeriod"/>
-            </a:pPr>
-            <a:r>
-              <a:rPr lang="es-ES" sz="1400" dirty="0">
-                <a:latin typeface="Times New Roman" panose="02020603050405020304" pitchFamily="18" charset="0"/>
-                <a:cs typeface="Times New Roman" panose="02020603050405020304" pitchFamily="18" charset="0"/>
-              </a:rPr>
-              <a:t>Integrar legalizaciones anteriores al 2005: ¿Cómo definición de grupos o como parte del </a:t>
-            </a:r>
-            <a:r>
-              <a:rPr lang="es-ES" sz="1400" i="1" dirty="0">
-                <a:latin typeface="Times New Roman" panose="02020603050405020304" pitchFamily="18" charset="0"/>
-                <a:cs typeface="Times New Roman" panose="02020603050405020304" pitchFamily="18" charset="0"/>
-              </a:rPr>
-              <a:t>PS</a:t>
-            </a:r>
-            <a:r>
-              <a:rPr lang="es-ES" sz="1400" dirty="0">
-                <a:latin typeface="Times New Roman" panose="02020603050405020304" pitchFamily="18" charset="0"/>
-                <a:cs typeface="Times New Roman" panose="02020603050405020304" pitchFamily="18" charset="0"/>
-              </a:rPr>
-              <a:t>?</a:t>
-            </a:r>
-          </a:p>
-          <a:p>
-            <a:pPr marL="342900" indent="-342900">
-              <a:buFont typeface="+mj-lt"/>
-              <a:buAutoNum type="arabicPeriod"/>
-            </a:pPr>
-            <a:endParaRPr lang="es-ES" sz="1400" dirty="0">
-              <a:latin typeface="Times New Roman" panose="02020603050405020304" pitchFamily="18" charset="0"/>
-              <a:cs typeface="Times New Roman" panose="02020603050405020304" pitchFamily="18" charset="0"/>
-            </a:endParaRPr>
-          </a:p>
-          <a:p>
-            <a:pPr marL="342900" indent="-342900">
-              <a:buFont typeface="+mj-lt"/>
-              <a:buAutoNum type="arabicPeriod"/>
-            </a:pPr>
-            <a:r>
-              <a:rPr lang="es-ES" sz="1400" dirty="0">
-                <a:latin typeface="Times New Roman" panose="02020603050405020304" pitchFamily="18" charset="0"/>
-                <a:cs typeface="Times New Roman" panose="02020603050405020304" pitchFamily="18" charset="0"/>
-              </a:rPr>
-              <a:t>Endogeneidad</a:t>
-            </a:r>
-          </a:p>
-          <a:p>
-            <a:pPr marL="342900" indent="-342900">
-              <a:buFont typeface="+mj-lt"/>
-              <a:buAutoNum type="arabicPeriod"/>
-            </a:pPr>
-            <a:endParaRPr lang="es-ES" sz="1400" dirty="0">
-              <a:latin typeface="Times New Roman" panose="02020603050405020304" pitchFamily="18" charset="0"/>
-              <a:cs typeface="Times New Roman" panose="02020603050405020304" pitchFamily="18" charset="0"/>
-            </a:endParaRPr>
-          </a:p>
-          <a:p>
-            <a:pPr marL="342900" indent="-342900">
-              <a:buFont typeface="+mj-lt"/>
-              <a:buAutoNum type="arabicPeriod"/>
-            </a:pPr>
-            <a:r>
-              <a:rPr lang="es-ES" sz="1400" dirty="0">
-                <a:latin typeface="Times New Roman" panose="02020603050405020304" pitchFamily="18" charset="0"/>
-                <a:cs typeface="Times New Roman" panose="02020603050405020304" pitchFamily="18" charset="0"/>
-              </a:rPr>
-              <a:t>Tendencias paralelas</a:t>
-            </a:r>
-          </a:p>
-          <a:p>
-            <a:pPr marL="342900" indent="-342900">
-              <a:buFont typeface="+mj-lt"/>
-              <a:buAutoNum type="arabicPeriod"/>
-            </a:pPr>
-            <a:endParaRPr lang="es-ES" sz="1400" dirty="0">
-              <a:latin typeface="Times New Roman" panose="02020603050405020304" pitchFamily="18" charset="0"/>
-              <a:cs typeface="Times New Roman" panose="02020603050405020304" pitchFamily="18" charset="0"/>
-            </a:endParaRPr>
-          </a:p>
-          <a:p>
-            <a:pPr marL="342900" indent="-342900">
-              <a:buFont typeface="+mj-lt"/>
-              <a:buAutoNum type="arabicPeriod"/>
-            </a:pPr>
-            <a:endParaRPr lang="es-ES" sz="1400" dirty="0">
-              <a:latin typeface="Times New Roman" panose="02020603050405020304" pitchFamily="18" charset="0"/>
-              <a:cs typeface="Times New Roman" panose="02020603050405020304" pitchFamily="18" charset="0"/>
-            </a:endParaRPr>
-          </a:p>
-          <a:p>
-            <a:pPr marL="342900" indent="-342900">
-              <a:buFont typeface="+mj-lt"/>
-              <a:buAutoNum type="arabicPeriod"/>
-            </a:pPr>
-            <a:endParaRPr lang="es-ES" dirty="0">
-              <a:latin typeface="Times New Roman" panose="02020603050405020304" pitchFamily="18" charset="0"/>
-              <a:cs typeface="Times New Roman" panose="02020603050405020304" pitchFamily="18" charset="0"/>
-            </a:endParaRPr>
-          </a:p>
-        </p:txBody>
-      </p:sp>
       <p:pic>
         <p:nvPicPr>
           <p:cNvPr id="18" name="Picture 17">
@@ -11503,7 +11226,7 @@
         <p:spPr>
           <a:xfrm>
             <a:off x="-35560" y="-60960"/>
-            <a:ext cx="2844800" cy="461665"/>
+            <a:ext cx="5210914" cy="461665"/>
           </a:xfrm>
           <a:prstGeom prst="rect">
             <a:avLst/>
@@ -11521,28 +11244,14 @@
                 <a:latin typeface="Times New Roman" panose="02020603050405020304" pitchFamily="18" charset="0"/>
                 <a:cs typeface="Times New Roman" panose="02020603050405020304" pitchFamily="18" charset="0"/>
               </a:rPr>
-              <a:t>Q</a:t>
+              <a:t>G</a:t>
             </a:r>
             <a:r>
               <a:rPr lang="en-US" sz="1600" dirty="0">
                 <a:latin typeface="Times New Roman" panose="02020603050405020304" pitchFamily="18" charset="0"/>
                 <a:cs typeface="Times New Roman" panose="02020603050405020304" pitchFamily="18" charset="0"/>
               </a:rPr>
-              <a:t>uestions 15 </a:t>
-            </a:r>
-            <a:r>
-              <a:rPr lang="en-US" sz="1600" dirty="0" err="1">
-                <a:latin typeface="Times New Roman" panose="02020603050405020304" pitchFamily="18" charset="0"/>
-                <a:cs typeface="Times New Roman" panose="02020603050405020304" pitchFamily="18" charset="0"/>
-              </a:rPr>
-              <a:t>sep</a:t>
-            </a:r>
-            <a:r>
-              <a:rPr lang="en-US" sz="1600" dirty="0">
-                <a:latin typeface="Times New Roman" panose="02020603050405020304" pitchFamily="18" charset="0"/>
-                <a:cs typeface="Times New Roman" panose="02020603050405020304" pitchFamily="18" charset="0"/>
-              </a:rPr>
-              <a:t> 2022</a:t>
+              <a:t>eographic analysis: Identification of treatment status</a:t>
             </a:r>
             <a:endParaRPr lang="en-US" sz="1000" dirty="0">
               <a:latin typeface="Times New Roman" panose="02020603050405020304" pitchFamily="18" charset="0"/>
@@ -11709,15 +11418,15 @@
       </p:sp>
       <p:pic>
         <p:nvPicPr>
-          <p:cNvPr id="14" name="Picture 13">
-            <a:extLst>
-              <a:ext uri="{FF2B5EF4-FFF2-40B4-BE49-F238E27FC236}">
-                <a16:creationId xmlns:a16="http://schemas.microsoft.com/office/drawing/2014/main" id="{9CFA27CD-3FE9-671D-2A4A-DCB6EC8AB5D5}"/>
+          <p:cNvPr id="3" name="Picture 2" descr="Chart, scatter chart&#10;&#10;Description automatically generated">
+            <a:extLst>
+              <a:ext uri="{FF2B5EF4-FFF2-40B4-BE49-F238E27FC236}">
+                <a16:creationId xmlns:a16="http://schemas.microsoft.com/office/drawing/2014/main" id="{57AF9D47-8AA9-F8CC-FB14-9F24778B573D}"/>
               </a:ext>
             </a:extLst>
           </p:cNvPr>
           <p:cNvPicPr>
-            <a:picLocks noChangeAspect="1" noChangeArrowheads="1"/>
+            <a:picLocks noChangeAspect="1"/>
           </p:cNvPicPr>
           <p:nvPr/>
         </p:nvPicPr>
@@ -11729,35 +11438,180 @@
               </a:ext>
             </a:extLst>
           </a:blip>
-          <a:srcRect/>
           <a:stretch>
             <a:fillRect/>
           </a:stretch>
         </p:blipFill>
-        <p:spPr bwMode="auto">
-          <a:xfrm>
-            <a:off x="1988819" y="2456059"/>
-            <a:ext cx="4072891" cy="1164982"/>
+        <p:spPr>
+          <a:xfrm>
+            <a:off x="136766" y="1159349"/>
+            <a:ext cx="7752357" cy="3948549"/>
           </a:xfrm>
           <a:prstGeom prst="rect">
             <a:avLst/>
           </a:prstGeom>
+        </p:spPr>
+      </p:pic>
+      <p:sp>
+        <p:nvSpPr>
+          <p:cNvPr id="14" name="TextBox 13">
+            <a:extLst>
+              <a:ext uri="{FF2B5EF4-FFF2-40B4-BE49-F238E27FC236}">
+                <a16:creationId xmlns:a16="http://schemas.microsoft.com/office/drawing/2014/main" id="{00CFF604-7B32-38E4-D71D-0F7F5F8247C8}"/>
+              </a:ext>
+            </a:extLst>
+          </p:cNvPr>
+          <p:cNvSpPr txBox="1"/>
+          <p:nvPr/>
+        </p:nvSpPr>
+        <p:spPr>
+          <a:xfrm>
+            <a:off x="8345226" y="1249130"/>
+            <a:ext cx="3563912" cy="1969770"/>
+          </a:xfrm>
+          <a:prstGeom prst="rect">
+            <a:avLst/>
+          </a:prstGeom>
           <a:noFill/>
-          <a:extLst>
-            <a:ext uri="{909E8E84-426E-40DD-AFC4-6F175D3DCCD1}">
-              <a14:hiddenFill xmlns:a14="http://schemas.microsoft.com/office/drawing/2010/main">
-                <a:solidFill>
-                  <a:srgbClr val="FFFFFF"/>
-                </a:solidFill>
-              </a14:hiddenFill>
-            </a:ext>
-          </a:extLst>
-        </p:spPr>
-      </p:pic>
+        </p:spPr>
+        <p:txBody>
+          <a:bodyPr wrap="square" rtlCol="0">
+            <a:spAutoFit/>
+          </a:bodyPr>
+          <a:lstStyle/>
+          <a:p>
+            <a:endParaRPr lang="en-US" sz="1200" dirty="0">
+              <a:latin typeface="Times New Roman" panose="02020603050405020304" pitchFamily="18" charset="0"/>
+              <a:cs typeface="Times New Roman" panose="02020603050405020304" pitchFamily="18" charset="0"/>
+            </a:endParaRPr>
+          </a:p>
+          <a:p>
+            <a:pPr marL="228600" indent="-228600">
+              <a:buFont typeface="+mj-lt"/>
+              <a:buAutoNum type="arabicPeriod"/>
+            </a:pPr>
+            <a:endParaRPr lang="en-US" sz="1200" dirty="0">
+              <a:latin typeface="Times New Roman" panose="02020603050405020304" pitchFamily="18" charset="0"/>
+              <a:cs typeface="Times New Roman" panose="02020603050405020304" pitchFamily="18" charset="0"/>
+            </a:endParaRPr>
+          </a:p>
+          <a:p>
+            <a:pPr marL="228600" indent="-228600">
+              <a:buFont typeface="+mj-lt"/>
+              <a:buAutoNum type="arabicPeriod"/>
+            </a:pPr>
+            <a:r>
+              <a:rPr lang="en-US" sz="1200" dirty="0">
+                <a:latin typeface="Times New Roman" panose="02020603050405020304" pitchFamily="18" charset="0"/>
+                <a:cs typeface="Times New Roman" panose="02020603050405020304" pitchFamily="18" charset="0"/>
+              </a:rPr>
+              <a:t>Unit of analysis is a standardized gomphacil unit.</a:t>
+            </a:r>
+          </a:p>
+          <a:p>
+            <a:pPr marL="228600" indent="-228600">
+              <a:buFont typeface="+mj-lt"/>
+              <a:buAutoNum type="arabicPeriod"/>
+            </a:pPr>
+            <a:endParaRPr lang="en-US" sz="1400" dirty="0">
+              <a:latin typeface="Times New Roman" panose="02020603050405020304" pitchFamily="18" charset="0"/>
+              <a:cs typeface="Times New Roman" panose="02020603050405020304" pitchFamily="18" charset="0"/>
+            </a:endParaRPr>
+          </a:p>
+          <a:p>
+            <a:pPr marL="228600" indent="-228600">
+              <a:buFont typeface="+mj-lt"/>
+              <a:buAutoNum type="arabicPeriod"/>
+            </a:pPr>
+            <a:r>
+              <a:rPr lang="en-US" sz="1200" dirty="0">
+                <a:latin typeface="Times New Roman" panose="02020603050405020304" pitchFamily="18" charset="0"/>
+                <a:cs typeface="Times New Roman" panose="02020603050405020304" pitchFamily="18" charset="0"/>
+              </a:rPr>
+              <a:t>Treatment and controls are defined by nor by centroid intersection (B) but rather by closest centroid (C), to avoid treated unit’s omission.</a:t>
+            </a:r>
+          </a:p>
+          <a:p>
+            <a:pPr marL="228600" indent="-228600">
+              <a:buFont typeface="+mj-lt"/>
+              <a:buAutoNum type="arabicPeriod"/>
+            </a:pPr>
+            <a:endParaRPr lang="en-US" sz="1200" dirty="0">
+              <a:latin typeface="Times New Roman" panose="02020603050405020304" pitchFamily="18" charset="0"/>
+              <a:cs typeface="Times New Roman" panose="02020603050405020304" pitchFamily="18" charset="0"/>
+            </a:endParaRPr>
+          </a:p>
+          <a:p>
+            <a:pPr marL="228600" indent="-228600" algn="just">
+              <a:buFont typeface="+mj-lt"/>
+              <a:buAutoNum type="arabicPeriod"/>
+            </a:pPr>
+            <a:r>
+              <a:rPr lang="en-US" sz="1200" i="1" dirty="0">
+                <a:latin typeface="Times New Roman" panose="02020603050405020304" pitchFamily="18" charset="0"/>
+                <a:cs typeface="Times New Roman" panose="02020603050405020304" pitchFamily="18" charset="0"/>
+              </a:rPr>
+              <a:t>Exposure level</a:t>
+            </a:r>
+            <a:r>
+              <a:rPr lang="en-US" sz="1200" dirty="0">
+                <a:latin typeface="Times New Roman" panose="02020603050405020304" pitchFamily="18" charset="0"/>
+                <a:cs typeface="Times New Roman" panose="02020603050405020304" pitchFamily="18" charset="0"/>
+              </a:rPr>
+              <a:t> are defined by contiguity and distance between centroids.</a:t>
+            </a:r>
+          </a:p>
+        </p:txBody>
+      </p:sp>
+      <p:cxnSp>
+        <p:nvCxnSpPr>
+          <p:cNvPr id="5" name="Straight Connector 4">
+            <a:extLst>
+              <a:ext uri="{FF2B5EF4-FFF2-40B4-BE49-F238E27FC236}">
+                <a16:creationId xmlns:a16="http://schemas.microsoft.com/office/drawing/2014/main" id="{2E2B6B4D-14F0-6F87-3320-011F05FB7CF1}"/>
+              </a:ext>
+            </a:extLst>
+          </p:cNvPr>
+          <p:cNvCxnSpPr/>
+          <p:nvPr/>
+        </p:nvCxnSpPr>
+        <p:spPr>
+          <a:xfrm>
+            <a:off x="8117174" y="734518"/>
+            <a:ext cx="0" cy="4946754"/>
+          </a:xfrm>
+          <a:prstGeom prst="line">
+            <a:avLst/>
+          </a:prstGeom>
+          <a:ln>
+            <a:solidFill>
+              <a:schemeClr val="bg1">
+                <a:lumMod val="65000"/>
+              </a:schemeClr>
+            </a:solidFill>
+            <a:headEnd type="oval" w="med" len="med"/>
+            <a:tailEnd type="oval" w="med" len="med"/>
+          </a:ln>
+        </p:spPr>
+        <p:style>
+          <a:lnRef idx="1">
+            <a:schemeClr val="accent1"/>
+          </a:lnRef>
+          <a:fillRef idx="0">
+            <a:schemeClr val="accent1"/>
+          </a:fillRef>
+          <a:effectRef idx="0">
+            <a:schemeClr val="accent1"/>
+          </a:effectRef>
+          <a:fontRef idx="minor">
+            <a:schemeClr val="tx1"/>
+          </a:fontRef>
+        </p:style>
+      </p:cxnSp>
     </p:spTree>
     <p:extLst>
       <p:ext uri="{BB962C8B-B14F-4D97-AF65-F5344CB8AC3E}">
-        <p14:creationId xmlns:p14="http://schemas.microsoft.com/office/powerpoint/2010/main" val="735485465"/>
+        <p14:creationId xmlns:p14="http://schemas.microsoft.com/office/powerpoint/2010/main" val="2329869366"/>
       </p:ext>
     </p:extLst>
   </p:cSld>
@@ -11906,6 +11760,2686 @@
                 <a:cs typeface="Times New Roman" panose="02020603050405020304" pitchFamily="18" charset="0"/>
               </a:rPr>
               <a:t>13</a:t>
+            </a:fld>
+            <a:endParaRPr lang="en-US" b="1" dirty="0">
+              <a:solidFill>
+                <a:schemeClr val="tx1">
+                  <a:lumMod val="65000"/>
+                  <a:lumOff val="35000"/>
+                </a:schemeClr>
+              </a:solidFill>
+              <a:latin typeface="Times New Roman" panose="02020603050405020304" pitchFamily="18" charset="0"/>
+              <a:cs typeface="Times New Roman" panose="02020603050405020304" pitchFamily="18" charset="0"/>
+            </a:endParaRPr>
+          </a:p>
+        </p:txBody>
+      </p:sp>
+      <p:cxnSp>
+        <p:nvCxnSpPr>
+          <p:cNvPr id="24" name="Straight Connector 23">
+            <a:extLst>
+              <a:ext uri="{FF2B5EF4-FFF2-40B4-BE49-F238E27FC236}">
+                <a16:creationId xmlns:a16="http://schemas.microsoft.com/office/drawing/2014/main" id="{54F913B5-02C0-0E8C-67FD-C40042FE88B1}"/>
+              </a:ext>
+            </a:extLst>
+          </p:cNvPr>
+          <p:cNvCxnSpPr/>
+          <p:nvPr/>
+        </p:nvCxnSpPr>
+        <p:spPr>
+          <a:xfrm>
+            <a:off x="0" y="328990"/>
+            <a:ext cx="3759200" cy="0"/>
+          </a:xfrm>
+          <a:prstGeom prst="line">
+            <a:avLst/>
+          </a:prstGeom>
+          <a:ln>
+            <a:solidFill>
+              <a:schemeClr val="tx1">
+                <a:lumMod val="50000"/>
+                <a:lumOff val="50000"/>
+              </a:schemeClr>
+            </a:solidFill>
+          </a:ln>
+        </p:spPr>
+        <p:style>
+          <a:lnRef idx="1">
+            <a:schemeClr val="accent1"/>
+          </a:lnRef>
+          <a:fillRef idx="0">
+            <a:schemeClr val="accent1"/>
+          </a:fillRef>
+          <a:effectRef idx="0">
+            <a:schemeClr val="accent1"/>
+          </a:effectRef>
+          <a:fontRef idx="minor">
+            <a:schemeClr val="tx1"/>
+          </a:fontRef>
+        </p:style>
+      </p:cxnSp>
+      <p:sp>
+        <p:nvSpPr>
+          <p:cNvPr id="26" name="TextBox 25">
+            <a:extLst>
+              <a:ext uri="{FF2B5EF4-FFF2-40B4-BE49-F238E27FC236}">
+                <a16:creationId xmlns:a16="http://schemas.microsoft.com/office/drawing/2014/main" id="{0980D4F8-F9A4-5B77-F1B2-5F98FF6D54DC}"/>
+              </a:ext>
+            </a:extLst>
+          </p:cNvPr>
+          <p:cNvSpPr txBox="1"/>
+          <p:nvPr/>
+        </p:nvSpPr>
+        <p:spPr>
+          <a:xfrm>
+            <a:off x="-35560" y="-60960"/>
+            <a:ext cx="5210914" cy="461665"/>
+          </a:xfrm>
+          <a:prstGeom prst="rect">
+            <a:avLst/>
+          </a:prstGeom>
+          <a:noFill/>
+        </p:spPr>
+        <p:txBody>
+          <a:bodyPr wrap="square" rtlCol="0">
+            <a:spAutoFit/>
+          </a:bodyPr>
+          <a:lstStyle/>
+          <a:p>
+            <a:r>
+              <a:rPr lang="en-US" sz="2400" dirty="0">
+                <a:latin typeface="Times New Roman" panose="02020603050405020304" pitchFamily="18" charset="0"/>
+                <a:cs typeface="Times New Roman" panose="02020603050405020304" pitchFamily="18" charset="0"/>
+              </a:rPr>
+              <a:t>G</a:t>
+            </a:r>
+            <a:r>
+              <a:rPr lang="en-US" sz="1600" dirty="0">
+                <a:latin typeface="Times New Roman" panose="02020603050405020304" pitchFamily="18" charset="0"/>
+                <a:cs typeface="Times New Roman" panose="02020603050405020304" pitchFamily="18" charset="0"/>
+              </a:rPr>
+              <a:t>eographic analysis: Identification of treatment status</a:t>
+            </a:r>
+            <a:endParaRPr lang="en-US" sz="1000" dirty="0">
+              <a:latin typeface="Times New Roman" panose="02020603050405020304" pitchFamily="18" charset="0"/>
+              <a:cs typeface="Times New Roman" panose="02020603050405020304" pitchFamily="18" charset="0"/>
+            </a:endParaRPr>
+          </a:p>
+        </p:txBody>
+      </p:sp>
+      <p:sp>
+        <p:nvSpPr>
+          <p:cNvPr id="27" name="Footer Placeholder 19">
+            <a:extLst>
+              <a:ext uri="{FF2B5EF4-FFF2-40B4-BE49-F238E27FC236}">
+                <a16:creationId xmlns:a16="http://schemas.microsoft.com/office/drawing/2014/main" id="{E56119E7-DDAB-699C-01DB-261EAC7CC30A}"/>
+              </a:ext>
+            </a:extLst>
+          </p:cNvPr>
+          <p:cNvSpPr txBox="1">
+            <a:spLocks/>
+          </p:cNvSpPr>
+          <p:nvPr/>
+        </p:nvSpPr>
+        <p:spPr>
+          <a:xfrm>
+            <a:off x="0" y="6439217"/>
+            <a:ext cx="2316480" cy="365125"/>
+          </a:xfrm>
+          <a:prstGeom prst="rect">
+            <a:avLst/>
+          </a:prstGeom>
+        </p:spPr>
+        <p:txBody>
+          <a:bodyPr vert="horz" lIns="91440" tIns="45720" rIns="91440" bIns="45720" rtlCol="0" anchor="ctr"/>
+          <a:lstStyle>
+            <a:defPPr>
+              <a:defRPr lang="en-US"/>
+            </a:defPPr>
+            <a:lvl1pPr marL="0" algn="ctr" defTabSz="914400" rtl="0" eaLnBrk="1" latinLnBrk="0" hangingPunct="1">
+              <a:defRPr sz="1200" kern="1200">
+                <a:solidFill>
+                  <a:schemeClr val="tx1">
+                    <a:tint val="75000"/>
+                  </a:schemeClr>
+                </a:solidFill>
+                <a:latin typeface="+mn-lt"/>
+                <a:ea typeface="+mn-ea"/>
+                <a:cs typeface="+mn-cs"/>
+              </a:defRPr>
+            </a:lvl1pPr>
+            <a:lvl2pPr marL="457200" algn="l" defTabSz="914400" rtl="0" eaLnBrk="1" latinLnBrk="0" hangingPunct="1">
+              <a:defRPr sz="1800" kern="1200">
+                <a:solidFill>
+                  <a:schemeClr val="tx1"/>
+                </a:solidFill>
+                <a:latin typeface="+mn-lt"/>
+                <a:ea typeface="+mn-ea"/>
+                <a:cs typeface="+mn-cs"/>
+              </a:defRPr>
+            </a:lvl2pPr>
+            <a:lvl3pPr marL="914400" algn="l" defTabSz="914400" rtl="0" eaLnBrk="1" latinLnBrk="0" hangingPunct="1">
+              <a:defRPr sz="1800" kern="1200">
+                <a:solidFill>
+                  <a:schemeClr val="tx1"/>
+                </a:solidFill>
+                <a:latin typeface="+mn-lt"/>
+                <a:ea typeface="+mn-ea"/>
+                <a:cs typeface="+mn-cs"/>
+              </a:defRPr>
+            </a:lvl3pPr>
+            <a:lvl4pPr marL="1371600" algn="l" defTabSz="914400" rtl="0" eaLnBrk="1" latinLnBrk="0" hangingPunct="1">
+              <a:defRPr sz="1800" kern="1200">
+                <a:solidFill>
+                  <a:schemeClr val="tx1"/>
+                </a:solidFill>
+                <a:latin typeface="+mn-lt"/>
+                <a:ea typeface="+mn-ea"/>
+                <a:cs typeface="+mn-cs"/>
+              </a:defRPr>
+            </a:lvl4pPr>
+            <a:lvl5pPr marL="1828800" algn="l" defTabSz="914400" rtl="0" eaLnBrk="1" latinLnBrk="0" hangingPunct="1">
+              <a:defRPr sz="1800" kern="1200">
+                <a:solidFill>
+                  <a:schemeClr val="tx1"/>
+                </a:solidFill>
+                <a:latin typeface="+mn-lt"/>
+                <a:ea typeface="+mn-ea"/>
+                <a:cs typeface="+mn-cs"/>
+              </a:defRPr>
+            </a:lvl5pPr>
+            <a:lvl6pPr marL="2286000" algn="l" defTabSz="914400" rtl="0" eaLnBrk="1" latinLnBrk="0" hangingPunct="1">
+              <a:defRPr sz="1800" kern="1200">
+                <a:solidFill>
+                  <a:schemeClr val="tx1"/>
+                </a:solidFill>
+                <a:latin typeface="+mn-lt"/>
+                <a:ea typeface="+mn-ea"/>
+                <a:cs typeface="+mn-cs"/>
+              </a:defRPr>
+            </a:lvl6pPr>
+            <a:lvl7pPr marL="2743200" algn="l" defTabSz="914400" rtl="0" eaLnBrk="1" latinLnBrk="0" hangingPunct="1">
+              <a:defRPr sz="1800" kern="1200">
+                <a:solidFill>
+                  <a:schemeClr val="tx1"/>
+                </a:solidFill>
+                <a:latin typeface="+mn-lt"/>
+                <a:ea typeface="+mn-ea"/>
+                <a:cs typeface="+mn-cs"/>
+              </a:defRPr>
+            </a:lvl7pPr>
+            <a:lvl8pPr marL="3200400" algn="l" defTabSz="914400" rtl="0" eaLnBrk="1" latinLnBrk="0" hangingPunct="1">
+              <a:defRPr sz="1800" kern="1200">
+                <a:solidFill>
+                  <a:schemeClr val="tx1"/>
+                </a:solidFill>
+                <a:latin typeface="+mn-lt"/>
+                <a:ea typeface="+mn-ea"/>
+                <a:cs typeface="+mn-cs"/>
+              </a:defRPr>
+            </a:lvl8pPr>
+            <a:lvl9pPr marL="3657600" algn="l" defTabSz="914400" rtl="0" eaLnBrk="1" latinLnBrk="0" hangingPunct="1">
+              <a:defRPr sz="1800" kern="1200">
+                <a:solidFill>
+                  <a:schemeClr val="tx1"/>
+                </a:solidFill>
+                <a:latin typeface="+mn-lt"/>
+                <a:ea typeface="+mn-ea"/>
+                <a:cs typeface="+mn-cs"/>
+              </a:defRPr>
+            </a:lvl9pPr>
+          </a:lstStyle>
+          <a:p>
+            <a:pPr algn="l"/>
+            <a:r>
+              <a:rPr lang="en-US" sz="800" dirty="0">
+                <a:solidFill>
+                  <a:schemeClr val="tx1">
+                    <a:lumMod val="75000"/>
+                    <a:lumOff val="25000"/>
+                  </a:schemeClr>
+                </a:solidFill>
+                <a:latin typeface="Times New Roman" panose="02020603050405020304" pitchFamily="18" charset="0"/>
+                <a:cs typeface="Times New Roman" panose="02020603050405020304" pitchFamily="18" charset="0"/>
+              </a:rPr>
+              <a:t>Universidad del Rosario - Faculty of Economics</a:t>
+            </a:r>
+          </a:p>
+          <a:p>
+            <a:pPr algn="l"/>
+            <a:r>
+              <a:rPr lang="en-US" sz="800" dirty="0">
+                <a:solidFill>
+                  <a:schemeClr val="tx1">
+                    <a:lumMod val="75000"/>
+                    <a:lumOff val="25000"/>
+                  </a:schemeClr>
+                </a:solidFill>
+                <a:latin typeface="Times New Roman" panose="02020603050405020304" pitchFamily="18" charset="0"/>
+                <a:cs typeface="Times New Roman" panose="02020603050405020304" pitchFamily="18" charset="0"/>
+              </a:rPr>
+              <a:t>Guibor Camargo</a:t>
+            </a:r>
+          </a:p>
+        </p:txBody>
+      </p:sp>
+      <p:sp>
+        <p:nvSpPr>
+          <p:cNvPr id="14" name="TextBox 13">
+            <a:extLst>
+              <a:ext uri="{FF2B5EF4-FFF2-40B4-BE49-F238E27FC236}">
+                <a16:creationId xmlns:a16="http://schemas.microsoft.com/office/drawing/2014/main" id="{00CFF604-7B32-38E4-D71D-0F7F5F8247C8}"/>
+              </a:ext>
+            </a:extLst>
+          </p:cNvPr>
+          <p:cNvSpPr txBox="1"/>
+          <p:nvPr/>
+        </p:nvSpPr>
+        <p:spPr>
+          <a:xfrm>
+            <a:off x="7127760" y="1117686"/>
+            <a:ext cx="4008589" cy="3808735"/>
+          </a:xfrm>
+          <a:prstGeom prst="rect">
+            <a:avLst/>
+          </a:prstGeom>
+          <a:noFill/>
+        </p:spPr>
+        <p:txBody>
+          <a:bodyPr wrap="square" rtlCol="0">
+            <a:spAutoFit/>
+          </a:bodyPr>
+          <a:lstStyle/>
+          <a:p>
+            <a:r>
+              <a:rPr lang="en-US" sz="1050" b="1" dirty="0">
+                <a:latin typeface="Times New Roman" panose="02020603050405020304" pitchFamily="18" charset="0"/>
+                <a:cs typeface="Times New Roman" panose="02020603050405020304" pitchFamily="18" charset="0"/>
+              </a:rPr>
+              <a:t>Differentiating types of control</a:t>
+            </a:r>
+          </a:p>
+          <a:p>
+            <a:endParaRPr lang="en-US" sz="1050" dirty="0">
+              <a:latin typeface="Times New Roman" panose="02020603050405020304" pitchFamily="18" charset="0"/>
+              <a:cs typeface="Times New Roman" panose="02020603050405020304" pitchFamily="18" charset="0"/>
+            </a:endParaRPr>
+          </a:p>
+          <a:p>
+            <a:r>
+              <a:rPr lang="en-US" sz="1050" dirty="0">
+                <a:latin typeface="Times New Roman" panose="02020603050405020304" pitchFamily="18" charset="0"/>
+                <a:cs typeface="Times New Roman" panose="02020603050405020304" pitchFamily="18" charset="0"/>
+              </a:rPr>
+              <a:t>To latter analyze spill over effects, we divide not treated units into five (5) groups:</a:t>
+            </a:r>
+          </a:p>
+          <a:p>
+            <a:endParaRPr lang="en-US" sz="1050" dirty="0">
+              <a:latin typeface="Times New Roman" panose="02020603050405020304" pitchFamily="18" charset="0"/>
+              <a:cs typeface="Times New Roman" panose="02020603050405020304" pitchFamily="18" charset="0"/>
+            </a:endParaRPr>
+          </a:p>
+          <a:p>
+            <a:pPr marL="685800" lvl="1" indent="-228600">
+              <a:buFont typeface="+mj-lt"/>
+              <a:buAutoNum type="arabicPeriod"/>
+            </a:pPr>
+            <a:r>
+              <a:rPr lang="en-US" sz="1050" dirty="0">
+                <a:latin typeface="Times New Roman" panose="02020603050405020304" pitchFamily="18" charset="0"/>
+                <a:cs typeface="Times New Roman" panose="02020603050405020304" pitchFamily="18" charset="0"/>
+              </a:rPr>
+              <a:t>Pure control (outsider): </a:t>
+            </a:r>
+            <a:r>
+              <a:rPr lang="en-US" sz="1050" dirty="0">
+                <a:solidFill>
+                  <a:srgbClr val="FF0000"/>
+                </a:solidFill>
+                <a:latin typeface="Times New Roman" panose="02020603050405020304" pitchFamily="18" charset="0"/>
+                <a:cs typeface="Times New Roman" panose="02020603050405020304" pitchFamily="18" charset="0"/>
+              </a:rPr>
+              <a:t>&gt;280m </a:t>
+            </a:r>
+            <a:r>
+              <a:rPr lang="en-US" sz="1050" dirty="0">
+                <a:latin typeface="Times New Roman" panose="02020603050405020304" pitchFamily="18" charset="0"/>
+                <a:cs typeface="Times New Roman" panose="02020603050405020304" pitchFamily="18" charset="0"/>
+              </a:rPr>
+              <a:t>from treated units</a:t>
+            </a:r>
+          </a:p>
+          <a:p>
+            <a:pPr marL="685800" lvl="1" indent="-228600">
+              <a:buFont typeface="+mj-lt"/>
+              <a:buAutoNum type="arabicPeriod"/>
+            </a:pPr>
+            <a:r>
+              <a:rPr lang="en-US" sz="1050" dirty="0">
+                <a:latin typeface="Times New Roman" panose="02020603050405020304" pitchFamily="18" charset="0"/>
+                <a:cs typeface="Times New Roman" panose="02020603050405020304" pitchFamily="18" charset="0"/>
+              </a:rPr>
+              <a:t>First order neighbor: </a:t>
+            </a:r>
+            <a:r>
+              <a:rPr lang="en-US" sz="1050" dirty="0">
+                <a:solidFill>
+                  <a:srgbClr val="FF0000"/>
+                </a:solidFill>
+                <a:latin typeface="Times New Roman" panose="02020603050405020304" pitchFamily="18" charset="0"/>
+                <a:cs typeface="Times New Roman" panose="02020603050405020304" pitchFamily="18" charset="0"/>
+              </a:rPr>
+              <a:t>&lt;80m</a:t>
+            </a:r>
+            <a:r>
+              <a:rPr lang="en-US" sz="1050" dirty="0">
+                <a:latin typeface="Times New Roman" panose="02020603050405020304" pitchFamily="18" charset="0"/>
+                <a:cs typeface="Times New Roman" panose="02020603050405020304" pitchFamily="18" charset="0"/>
+              </a:rPr>
+              <a:t> from treated units</a:t>
+            </a:r>
+          </a:p>
+          <a:p>
+            <a:pPr marL="685800" lvl="1" indent="-228600">
+              <a:buFont typeface="+mj-lt"/>
+              <a:buAutoNum type="arabicPeriod"/>
+            </a:pPr>
+            <a:r>
+              <a:rPr lang="en-US" sz="1050" dirty="0">
+                <a:latin typeface="Times New Roman" panose="02020603050405020304" pitchFamily="18" charset="0"/>
+                <a:cs typeface="Times New Roman" panose="02020603050405020304" pitchFamily="18" charset="0"/>
+              </a:rPr>
+              <a:t>Second order neighbor: </a:t>
+            </a:r>
+            <a:r>
+              <a:rPr lang="en-US" sz="1050" dirty="0">
+                <a:solidFill>
+                  <a:srgbClr val="FF0000"/>
+                </a:solidFill>
+                <a:latin typeface="Times New Roman" panose="02020603050405020304" pitchFamily="18" charset="0"/>
+                <a:cs typeface="Times New Roman" panose="02020603050405020304" pitchFamily="18" charset="0"/>
+              </a:rPr>
+              <a:t>80m to 140m </a:t>
+            </a:r>
+            <a:r>
+              <a:rPr lang="en-US" sz="1050" dirty="0">
+                <a:latin typeface="Times New Roman" panose="02020603050405020304" pitchFamily="18" charset="0"/>
+                <a:cs typeface="Times New Roman" panose="02020603050405020304" pitchFamily="18" charset="0"/>
+              </a:rPr>
+              <a:t>from treated units</a:t>
+            </a:r>
+          </a:p>
+          <a:p>
+            <a:pPr marL="685800" lvl="1" indent="-228600">
+              <a:buFont typeface="+mj-lt"/>
+              <a:buAutoNum type="arabicPeriod"/>
+            </a:pPr>
+            <a:r>
+              <a:rPr lang="en-US" sz="1050" dirty="0">
+                <a:latin typeface="Times New Roman" panose="02020603050405020304" pitchFamily="18" charset="0"/>
+                <a:cs typeface="Times New Roman" panose="02020603050405020304" pitchFamily="18" charset="0"/>
+              </a:rPr>
+              <a:t>Third order neighbor: </a:t>
+            </a:r>
+            <a:r>
+              <a:rPr lang="en-US" sz="1050" dirty="0">
+                <a:solidFill>
+                  <a:srgbClr val="FF0000"/>
+                </a:solidFill>
+                <a:latin typeface="Times New Roman" panose="02020603050405020304" pitchFamily="18" charset="0"/>
+                <a:cs typeface="Times New Roman" panose="02020603050405020304" pitchFamily="18" charset="0"/>
+              </a:rPr>
+              <a:t>140m to 210m </a:t>
+            </a:r>
+            <a:r>
+              <a:rPr lang="en-US" sz="1050" dirty="0">
+                <a:latin typeface="Times New Roman" panose="02020603050405020304" pitchFamily="18" charset="0"/>
+                <a:cs typeface="Times New Roman" panose="02020603050405020304" pitchFamily="18" charset="0"/>
+              </a:rPr>
+              <a:t>from treated units</a:t>
+            </a:r>
+          </a:p>
+          <a:p>
+            <a:pPr marL="685800" lvl="1" indent="-228600">
+              <a:buFont typeface="+mj-lt"/>
+              <a:buAutoNum type="arabicPeriod"/>
+            </a:pPr>
+            <a:r>
+              <a:rPr lang="en-US" sz="1050" dirty="0">
+                <a:latin typeface="Times New Roman" panose="02020603050405020304" pitchFamily="18" charset="0"/>
+                <a:cs typeface="Times New Roman" panose="02020603050405020304" pitchFamily="18" charset="0"/>
+              </a:rPr>
+              <a:t>Fourth order neighbor: </a:t>
+            </a:r>
+            <a:r>
+              <a:rPr lang="en-US" sz="1050" dirty="0">
+                <a:solidFill>
+                  <a:srgbClr val="FF0000"/>
+                </a:solidFill>
+                <a:latin typeface="Times New Roman" panose="02020603050405020304" pitchFamily="18" charset="0"/>
+                <a:cs typeface="Times New Roman" panose="02020603050405020304" pitchFamily="18" charset="0"/>
+              </a:rPr>
+              <a:t>210m to 280m </a:t>
+            </a:r>
+            <a:r>
+              <a:rPr lang="en-US" sz="1050" dirty="0">
+                <a:latin typeface="Times New Roman" panose="02020603050405020304" pitchFamily="18" charset="0"/>
+                <a:cs typeface="Times New Roman" panose="02020603050405020304" pitchFamily="18" charset="0"/>
+              </a:rPr>
+              <a:t>from treated units</a:t>
+            </a:r>
+          </a:p>
+          <a:p>
+            <a:pPr marL="685800" lvl="1" indent="-228600">
+              <a:buFont typeface="+mj-lt"/>
+              <a:buAutoNum type="arabicPeriod"/>
+            </a:pPr>
+            <a:endParaRPr lang="en-US" sz="1050" dirty="0">
+              <a:latin typeface="Times New Roman" panose="02020603050405020304" pitchFamily="18" charset="0"/>
+              <a:cs typeface="Times New Roman" panose="02020603050405020304" pitchFamily="18" charset="0"/>
+            </a:endParaRPr>
+          </a:p>
+          <a:p>
+            <a:endParaRPr lang="en-US" sz="1050" dirty="0">
+              <a:latin typeface="Times New Roman" panose="02020603050405020304" pitchFamily="18" charset="0"/>
+              <a:cs typeface="Times New Roman" panose="02020603050405020304" pitchFamily="18" charset="0"/>
+            </a:endParaRPr>
+          </a:p>
+          <a:p>
+            <a:r>
+              <a:rPr lang="en-US" sz="1050" b="1" dirty="0">
+                <a:latin typeface="Times New Roman" panose="02020603050405020304" pitchFamily="18" charset="0"/>
+                <a:cs typeface="Times New Roman" panose="02020603050405020304" pitchFamily="18" charset="0"/>
+              </a:rPr>
+              <a:t>Observable units</a:t>
+            </a:r>
+          </a:p>
+          <a:p>
+            <a:endParaRPr lang="en-US" sz="1050" dirty="0">
+              <a:latin typeface="Times New Roman" panose="02020603050405020304" pitchFamily="18" charset="0"/>
+              <a:cs typeface="Times New Roman" panose="02020603050405020304" pitchFamily="18" charset="0"/>
+            </a:endParaRPr>
+          </a:p>
+          <a:p>
+            <a:r>
+              <a:rPr lang="en-US" sz="1050" dirty="0">
+                <a:latin typeface="Times New Roman" panose="02020603050405020304" pitchFamily="18" charset="0"/>
+                <a:cs typeface="Times New Roman" panose="02020603050405020304" pitchFamily="18" charset="0"/>
+              </a:rPr>
+              <a:t>- No all units are observable in terms of illegal occupations, only those which are inside monitoring polygons. </a:t>
+            </a:r>
+          </a:p>
+          <a:p>
+            <a:endParaRPr lang="en-US" sz="1050" dirty="0">
+              <a:latin typeface="Times New Roman" panose="02020603050405020304" pitchFamily="18" charset="0"/>
+              <a:cs typeface="Times New Roman" panose="02020603050405020304" pitchFamily="18" charset="0"/>
+            </a:endParaRPr>
+          </a:p>
+          <a:p>
+            <a:r>
+              <a:rPr lang="en-US" sz="1050" dirty="0">
+                <a:latin typeface="Times New Roman" panose="02020603050405020304" pitchFamily="18" charset="0"/>
+                <a:cs typeface="Times New Roman" panose="02020603050405020304" pitchFamily="18" charset="0"/>
+              </a:rPr>
+              <a:t>- This polygons vary over time, so not all observable units, are always observed during the study period. </a:t>
+            </a:r>
+          </a:p>
+          <a:p>
+            <a:endParaRPr lang="en-US" sz="1050" dirty="0">
+              <a:latin typeface="Times New Roman" panose="02020603050405020304" pitchFamily="18" charset="0"/>
+              <a:cs typeface="Times New Roman" panose="02020603050405020304" pitchFamily="18" charset="0"/>
+            </a:endParaRPr>
+          </a:p>
+          <a:p>
+            <a:r>
+              <a:rPr lang="en-US" sz="1050" dirty="0">
+                <a:latin typeface="Times New Roman" panose="02020603050405020304" pitchFamily="18" charset="0"/>
+                <a:cs typeface="Times New Roman" panose="02020603050405020304" pitchFamily="18" charset="0"/>
+              </a:rPr>
+              <a:t>- We only selected continuously monitored units: units that once observed, are always observed in all following periods.</a:t>
+            </a:r>
+          </a:p>
+          <a:p>
+            <a:endParaRPr lang="en-US" sz="1050" dirty="0">
+              <a:latin typeface="Times New Roman" panose="02020603050405020304" pitchFamily="18" charset="0"/>
+              <a:cs typeface="Times New Roman" panose="02020603050405020304" pitchFamily="18" charset="0"/>
+            </a:endParaRPr>
+          </a:p>
+        </p:txBody>
+      </p:sp>
+      <p:pic>
+        <p:nvPicPr>
+          <p:cNvPr id="4" name="Picture 3" descr="A picture containing map&#10;&#10;Description automatically generated">
+            <a:extLst>
+              <a:ext uri="{FF2B5EF4-FFF2-40B4-BE49-F238E27FC236}">
+                <a16:creationId xmlns:a16="http://schemas.microsoft.com/office/drawing/2014/main" id="{B3EBA886-1F6C-71F8-7CA2-2F6296EEF9F7}"/>
+              </a:ext>
+            </a:extLst>
+          </p:cNvPr>
+          <p:cNvPicPr>
+            <a:picLocks noChangeAspect="1"/>
+          </p:cNvPicPr>
+          <p:nvPr/>
+        </p:nvPicPr>
+        <p:blipFill>
+          <a:blip r:embed="rId4">
+            <a:extLst>
+              <a:ext uri="{28A0092B-C50C-407E-A947-70E740481C1C}">
+                <a14:useLocalDpi xmlns:a14="http://schemas.microsoft.com/office/drawing/2010/main" val="0"/>
+              </a:ext>
+            </a:extLst>
+          </a:blip>
+          <a:stretch>
+            <a:fillRect/>
+          </a:stretch>
+        </p:blipFill>
+        <p:spPr>
+          <a:xfrm>
+            <a:off x="238395" y="859314"/>
+            <a:ext cx="6446490" cy="4833844"/>
+          </a:xfrm>
+          <a:prstGeom prst="rect">
+            <a:avLst/>
+          </a:prstGeom>
+        </p:spPr>
+      </p:pic>
+      <p:cxnSp>
+        <p:nvCxnSpPr>
+          <p:cNvPr id="5" name="Straight Connector 4">
+            <a:extLst>
+              <a:ext uri="{FF2B5EF4-FFF2-40B4-BE49-F238E27FC236}">
+                <a16:creationId xmlns:a16="http://schemas.microsoft.com/office/drawing/2014/main" id="{4E37D51E-8D26-30AC-58A6-18DAFCAC6EB1}"/>
+              </a:ext>
+            </a:extLst>
+          </p:cNvPr>
+          <p:cNvCxnSpPr/>
+          <p:nvPr/>
+        </p:nvCxnSpPr>
+        <p:spPr>
+          <a:xfrm>
+            <a:off x="6858001" y="742014"/>
+            <a:ext cx="0" cy="4946754"/>
+          </a:xfrm>
+          <a:prstGeom prst="line">
+            <a:avLst/>
+          </a:prstGeom>
+          <a:ln>
+            <a:solidFill>
+              <a:schemeClr val="bg1">
+                <a:lumMod val="65000"/>
+              </a:schemeClr>
+            </a:solidFill>
+            <a:headEnd type="oval" w="med" len="med"/>
+            <a:tailEnd type="oval" w="med" len="med"/>
+          </a:ln>
+        </p:spPr>
+        <p:style>
+          <a:lnRef idx="1">
+            <a:schemeClr val="accent1"/>
+          </a:lnRef>
+          <a:fillRef idx="0">
+            <a:schemeClr val="accent1"/>
+          </a:fillRef>
+          <a:effectRef idx="0">
+            <a:schemeClr val="accent1"/>
+          </a:effectRef>
+          <a:fontRef idx="minor">
+            <a:schemeClr val="tx1"/>
+          </a:fontRef>
+        </p:style>
+      </p:cxnSp>
+    </p:spTree>
+    <p:extLst>
+      <p:ext uri="{BB962C8B-B14F-4D97-AF65-F5344CB8AC3E}">
+        <p14:creationId xmlns:p14="http://schemas.microsoft.com/office/powerpoint/2010/main" val="1152395260"/>
+      </p:ext>
+    </p:extLst>
+  </p:cSld>
+  <p:clrMapOvr>
+    <a:masterClrMapping/>
+  </p:clrMapOvr>
+</p:sld>
+</file>
+
+<file path=ppt/slides/slide14.xml><?xml version="1.0" encoding="utf-8"?>
+<p:sld xmlns:a="http://schemas.openxmlformats.org/drawingml/2006/main" xmlns:r="http://schemas.openxmlformats.org/officeDocument/2006/relationships" xmlns:p="http://schemas.openxmlformats.org/presentationml/2006/main">
+  <p:cSld>
+    <p:spTree>
+      <p:nvGrpSpPr>
+        <p:cNvPr id="1" name=""/>
+        <p:cNvGrpSpPr/>
+        <p:nvPr/>
+      </p:nvGrpSpPr>
+      <p:grpSpPr>
+        <a:xfrm>
+          <a:off x="0" y="0"/>
+          <a:ext cx="0" cy="0"/>
+          <a:chOff x="0" y="0"/>
+          <a:chExt cx="0" cy="0"/>
+        </a:xfrm>
+      </p:grpSpPr>
+      <p:pic>
+        <p:nvPicPr>
+          <p:cNvPr id="18" name="Picture 17">
+            <a:extLst>
+              <a:ext uri="{FF2B5EF4-FFF2-40B4-BE49-F238E27FC236}">
+                <a16:creationId xmlns:a16="http://schemas.microsoft.com/office/drawing/2014/main" id="{755F0031-30C0-36D6-4A37-9B689C30C53A}"/>
+              </a:ext>
+            </a:extLst>
+          </p:cNvPr>
+          <p:cNvPicPr>
+            <a:picLocks noChangeAspect="1"/>
+          </p:cNvPicPr>
+          <p:nvPr/>
+        </p:nvPicPr>
+        <p:blipFill rotWithShape="1">
+          <a:blip r:embed="rId2">
+            <a:extLst>
+              <a:ext uri="{BEBA8EAE-BF5A-486C-A8C5-ECC9F3942E4B}">
+                <a14:imgProps xmlns:a14="http://schemas.microsoft.com/office/drawing/2010/main">
+                  <a14:imgLayer r:embed="rId3">
+                    <a14:imgEffect>
+                      <a14:brightnessContrast contrast="-20000"/>
+                    </a14:imgEffect>
+                  </a14:imgLayer>
+                </a14:imgProps>
+              </a:ext>
+            </a:extLst>
+          </a:blip>
+          <a:srcRect t="50147" b="2767"/>
+          <a:stretch/>
+        </p:blipFill>
+        <p:spPr>
+          <a:xfrm>
+            <a:off x="0" y="6385560"/>
+            <a:ext cx="12192000" cy="472440"/>
+          </a:xfrm>
+          <a:prstGeom prst="rect">
+            <a:avLst/>
+          </a:prstGeom>
+        </p:spPr>
+      </p:pic>
+      <p:sp>
+        <p:nvSpPr>
+          <p:cNvPr id="20" name="Footer Placeholder 19">
+            <a:extLst>
+              <a:ext uri="{FF2B5EF4-FFF2-40B4-BE49-F238E27FC236}">
+                <a16:creationId xmlns:a16="http://schemas.microsoft.com/office/drawing/2014/main" id="{16C6EE1C-B4C5-63DB-FDD9-2E5174F14162}"/>
+              </a:ext>
+            </a:extLst>
+          </p:cNvPr>
+          <p:cNvSpPr>
+            <a:spLocks noGrp="1"/>
+          </p:cNvSpPr>
+          <p:nvPr>
+            <p:ph type="ftr" sz="quarter" idx="11"/>
+          </p:nvPr>
+        </p:nvSpPr>
+        <p:spPr>
+          <a:xfrm>
+            <a:off x="9845040" y="6425931"/>
+            <a:ext cx="2092960" cy="365125"/>
+          </a:xfrm>
+        </p:spPr>
+        <p:txBody>
+          <a:bodyPr/>
+          <a:lstStyle/>
+          <a:p>
+            <a:pPr algn="r"/>
+            <a:r>
+              <a:rPr lang="en-US" sz="800" dirty="0">
+                <a:solidFill>
+                  <a:schemeClr val="tx1">
+                    <a:lumMod val="75000"/>
+                    <a:lumOff val="25000"/>
+                  </a:schemeClr>
+                </a:solidFill>
+                <a:latin typeface="Times New Roman" panose="02020603050405020304" pitchFamily="18" charset="0"/>
+                <a:cs typeface="Times New Roman" panose="02020603050405020304" pitchFamily="18" charset="0"/>
+              </a:rPr>
+              <a:t>The effect of neighborhood legalization on Bogotá’s informal growth</a:t>
+            </a:r>
+          </a:p>
+        </p:txBody>
+      </p:sp>
+      <p:sp>
+        <p:nvSpPr>
+          <p:cNvPr id="21" name="Slide Number Placeholder 20">
+            <a:extLst>
+              <a:ext uri="{FF2B5EF4-FFF2-40B4-BE49-F238E27FC236}">
+                <a16:creationId xmlns:a16="http://schemas.microsoft.com/office/drawing/2014/main" id="{43B8C7C9-117E-9253-C187-A3DE4A68EB5E}"/>
+              </a:ext>
+            </a:extLst>
+          </p:cNvPr>
+          <p:cNvSpPr>
+            <a:spLocks noGrp="1"/>
+          </p:cNvSpPr>
+          <p:nvPr>
+            <p:ph type="sldNum" sz="quarter" idx="12"/>
+          </p:nvPr>
+        </p:nvSpPr>
+        <p:spPr>
+          <a:xfrm>
+            <a:off x="11805920" y="6425932"/>
+            <a:ext cx="386080" cy="365125"/>
+          </a:xfrm>
+        </p:spPr>
+        <p:txBody>
+          <a:bodyPr/>
+          <a:lstStyle/>
+          <a:p>
+            <a:fld id="{2A4C3AE7-3FF8-4E88-8B99-ADBFDD32DDE0}" type="slidenum">
+              <a:rPr lang="en-US" b="1" smtClean="0">
+                <a:solidFill>
+                  <a:schemeClr val="tx1">
+                    <a:lumMod val="65000"/>
+                    <a:lumOff val="35000"/>
+                  </a:schemeClr>
+                </a:solidFill>
+                <a:latin typeface="Times New Roman" panose="02020603050405020304" pitchFamily="18" charset="0"/>
+                <a:cs typeface="Times New Roman" panose="02020603050405020304" pitchFamily="18" charset="0"/>
+              </a:rPr>
+              <a:t>14</a:t>
+            </a:fld>
+            <a:endParaRPr lang="en-US" b="1" dirty="0">
+              <a:solidFill>
+                <a:schemeClr val="tx1">
+                  <a:lumMod val="65000"/>
+                  <a:lumOff val="35000"/>
+                </a:schemeClr>
+              </a:solidFill>
+              <a:latin typeface="Times New Roman" panose="02020603050405020304" pitchFamily="18" charset="0"/>
+              <a:cs typeface="Times New Roman" panose="02020603050405020304" pitchFamily="18" charset="0"/>
+            </a:endParaRPr>
+          </a:p>
+        </p:txBody>
+      </p:sp>
+      <p:cxnSp>
+        <p:nvCxnSpPr>
+          <p:cNvPr id="24" name="Straight Connector 23">
+            <a:extLst>
+              <a:ext uri="{FF2B5EF4-FFF2-40B4-BE49-F238E27FC236}">
+                <a16:creationId xmlns:a16="http://schemas.microsoft.com/office/drawing/2014/main" id="{54F913B5-02C0-0E8C-67FD-C40042FE88B1}"/>
+              </a:ext>
+            </a:extLst>
+          </p:cNvPr>
+          <p:cNvCxnSpPr/>
+          <p:nvPr/>
+        </p:nvCxnSpPr>
+        <p:spPr>
+          <a:xfrm>
+            <a:off x="0" y="328990"/>
+            <a:ext cx="3759200" cy="0"/>
+          </a:xfrm>
+          <a:prstGeom prst="line">
+            <a:avLst/>
+          </a:prstGeom>
+          <a:ln>
+            <a:solidFill>
+              <a:schemeClr val="tx1">
+                <a:lumMod val="50000"/>
+                <a:lumOff val="50000"/>
+              </a:schemeClr>
+            </a:solidFill>
+          </a:ln>
+        </p:spPr>
+        <p:style>
+          <a:lnRef idx="1">
+            <a:schemeClr val="accent1"/>
+          </a:lnRef>
+          <a:fillRef idx="0">
+            <a:schemeClr val="accent1"/>
+          </a:fillRef>
+          <a:effectRef idx="0">
+            <a:schemeClr val="accent1"/>
+          </a:effectRef>
+          <a:fontRef idx="minor">
+            <a:schemeClr val="tx1"/>
+          </a:fontRef>
+        </p:style>
+      </p:cxnSp>
+      <p:sp>
+        <p:nvSpPr>
+          <p:cNvPr id="26" name="TextBox 25">
+            <a:extLst>
+              <a:ext uri="{FF2B5EF4-FFF2-40B4-BE49-F238E27FC236}">
+                <a16:creationId xmlns:a16="http://schemas.microsoft.com/office/drawing/2014/main" id="{0980D4F8-F9A4-5B77-F1B2-5F98FF6D54DC}"/>
+              </a:ext>
+            </a:extLst>
+          </p:cNvPr>
+          <p:cNvSpPr txBox="1"/>
+          <p:nvPr/>
+        </p:nvSpPr>
+        <p:spPr>
+          <a:xfrm>
+            <a:off x="-35560" y="-60960"/>
+            <a:ext cx="2844800" cy="461665"/>
+          </a:xfrm>
+          <a:prstGeom prst="rect">
+            <a:avLst/>
+          </a:prstGeom>
+          <a:noFill/>
+        </p:spPr>
+        <p:txBody>
+          <a:bodyPr wrap="square" rtlCol="0">
+            <a:spAutoFit/>
+          </a:bodyPr>
+          <a:lstStyle/>
+          <a:p>
+            <a:r>
+              <a:rPr lang="en-US" sz="2400" dirty="0">
+                <a:latin typeface="Times New Roman" panose="02020603050405020304" pitchFamily="18" charset="0"/>
+                <a:cs typeface="Times New Roman" panose="02020603050405020304" pitchFamily="18" charset="0"/>
+              </a:rPr>
+              <a:t>R</a:t>
+            </a:r>
+            <a:r>
+              <a:rPr lang="en-US" sz="1600" dirty="0">
+                <a:latin typeface="Times New Roman" panose="02020603050405020304" pitchFamily="18" charset="0"/>
+                <a:cs typeface="Times New Roman" panose="02020603050405020304" pitchFamily="18" charset="0"/>
+              </a:rPr>
+              <a:t>esults</a:t>
+            </a:r>
+            <a:endParaRPr lang="en-US" sz="1000" dirty="0">
+              <a:latin typeface="Times New Roman" panose="02020603050405020304" pitchFamily="18" charset="0"/>
+              <a:cs typeface="Times New Roman" panose="02020603050405020304" pitchFamily="18" charset="0"/>
+            </a:endParaRPr>
+          </a:p>
+        </p:txBody>
+      </p:sp>
+      <p:sp>
+        <p:nvSpPr>
+          <p:cNvPr id="27" name="Footer Placeholder 19">
+            <a:extLst>
+              <a:ext uri="{FF2B5EF4-FFF2-40B4-BE49-F238E27FC236}">
+                <a16:creationId xmlns:a16="http://schemas.microsoft.com/office/drawing/2014/main" id="{E56119E7-DDAB-699C-01DB-261EAC7CC30A}"/>
+              </a:ext>
+            </a:extLst>
+          </p:cNvPr>
+          <p:cNvSpPr txBox="1">
+            <a:spLocks/>
+          </p:cNvSpPr>
+          <p:nvPr/>
+        </p:nvSpPr>
+        <p:spPr>
+          <a:xfrm>
+            <a:off x="0" y="6439217"/>
+            <a:ext cx="2316480" cy="365125"/>
+          </a:xfrm>
+          <a:prstGeom prst="rect">
+            <a:avLst/>
+          </a:prstGeom>
+        </p:spPr>
+        <p:txBody>
+          <a:bodyPr vert="horz" lIns="91440" tIns="45720" rIns="91440" bIns="45720" rtlCol="0" anchor="ctr"/>
+          <a:lstStyle>
+            <a:defPPr>
+              <a:defRPr lang="en-US"/>
+            </a:defPPr>
+            <a:lvl1pPr marL="0" algn="ctr" defTabSz="914400" rtl="0" eaLnBrk="1" latinLnBrk="0" hangingPunct="1">
+              <a:defRPr sz="1200" kern="1200">
+                <a:solidFill>
+                  <a:schemeClr val="tx1">
+                    <a:tint val="75000"/>
+                  </a:schemeClr>
+                </a:solidFill>
+                <a:latin typeface="+mn-lt"/>
+                <a:ea typeface="+mn-ea"/>
+                <a:cs typeface="+mn-cs"/>
+              </a:defRPr>
+            </a:lvl1pPr>
+            <a:lvl2pPr marL="457200" algn="l" defTabSz="914400" rtl="0" eaLnBrk="1" latinLnBrk="0" hangingPunct="1">
+              <a:defRPr sz="1800" kern="1200">
+                <a:solidFill>
+                  <a:schemeClr val="tx1"/>
+                </a:solidFill>
+                <a:latin typeface="+mn-lt"/>
+                <a:ea typeface="+mn-ea"/>
+                <a:cs typeface="+mn-cs"/>
+              </a:defRPr>
+            </a:lvl2pPr>
+            <a:lvl3pPr marL="914400" algn="l" defTabSz="914400" rtl="0" eaLnBrk="1" latinLnBrk="0" hangingPunct="1">
+              <a:defRPr sz="1800" kern="1200">
+                <a:solidFill>
+                  <a:schemeClr val="tx1"/>
+                </a:solidFill>
+                <a:latin typeface="+mn-lt"/>
+                <a:ea typeface="+mn-ea"/>
+                <a:cs typeface="+mn-cs"/>
+              </a:defRPr>
+            </a:lvl3pPr>
+            <a:lvl4pPr marL="1371600" algn="l" defTabSz="914400" rtl="0" eaLnBrk="1" latinLnBrk="0" hangingPunct="1">
+              <a:defRPr sz="1800" kern="1200">
+                <a:solidFill>
+                  <a:schemeClr val="tx1"/>
+                </a:solidFill>
+                <a:latin typeface="+mn-lt"/>
+                <a:ea typeface="+mn-ea"/>
+                <a:cs typeface="+mn-cs"/>
+              </a:defRPr>
+            </a:lvl4pPr>
+            <a:lvl5pPr marL="1828800" algn="l" defTabSz="914400" rtl="0" eaLnBrk="1" latinLnBrk="0" hangingPunct="1">
+              <a:defRPr sz="1800" kern="1200">
+                <a:solidFill>
+                  <a:schemeClr val="tx1"/>
+                </a:solidFill>
+                <a:latin typeface="+mn-lt"/>
+                <a:ea typeface="+mn-ea"/>
+                <a:cs typeface="+mn-cs"/>
+              </a:defRPr>
+            </a:lvl5pPr>
+            <a:lvl6pPr marL="2286000" algn="l" defTabSz="914400" rtl="0" eaLnBrk="1" latinLnBrk="0" hangingPunct="1">
+              <a:defRPr sz="1800" kern="1200">
+                <a:solidFill>
+                  <a:schemeClr val="tx1"/>
+                </a:solidFill>
+                <a:latin typeface="+mn-lt"/>
+                <a:ea typeface="+mn-ea"/>
+                <a:cs typeface="+mn-cs"/>
+              </a:defRPr>
+            </a:lvl6pPr>
+            <a:lvl7pPr marL="2743200" algn="l" defTabSz="914400" rtl="0" eaLnBrk="1" latinLnBrk="0" hangingPunct="1">
+              <a:defRPr sz="1800" kern="1200">
+                <a:solidFill>
+                  <a:schemeClr val="tx1"/>
+                </a:solidFill>
+                <a:latin typeface="+mn-lt"/>
+                <a:ea typeface="+mn-ea"/>
+                <a:cs typeface="+mn-cs"/>
+              </a:defRPr>
+            </a:lvl7pPr>
+            <a:lvl8pPr marL="3200400" algn="l" defTabSz="914400" rtl="0" eaLnBrk="1" latinLnBrk="0" hangingPunct="1">
+              <a:defRPr sz="1800" kern="1200">
+                <a:solidFill>
+                  <a:schemeClr val="tx1"/>
+                </a:solidFill>
+                <a:latin typeface="+mn-lt"/>
+                <a:ea typeface="+mn-ea"/>
+                <a:cs typeface="+mn-cs"/>
+              </a:defRPr>
+            </a:lvl8pPr>
+            <a:lvl9pPr marL="3657600" algn="l" defTabSz="914400" rtl="0" eaLnBrk="1" latinLnBrk="0" hangingPunct="1">
+              <a:defRPr sz="1800" kern="1200">
+                <a:solidFill>
+                  <a:schemeClr val="tx1"/>
+                </a:solidFill>
+                <a:latin typeface="+mn-lt"/>
+                <a:ea typeface="+mn-ea"/>
+                <a:cs typeface="+mn-cs"/>
+              </a:defRPr>
+            </a:lvl9pPr>
+          </a:lstStyle>
+          <a:p>
+            <a:pPr algn="l"/>
+            <a:r>
+              <a:rPr lang="en-US" sz="800" dirty="0">
+                <a:solidFill>
+                  <a:schemeClr val="tx1">
+                    <a:lumMod val="75000"/>
+                    <a:lumOff val="25000"/>
+                  </a:schemeClr>
+                </a:solidFill>
+                <a:latin typeface="Times New Roman" panose="02020603050405020304" pitchFamily="18" charset="0"/>
+                <a:cs typeface="Times New Roman" panose="02020603050405020304" pitchFamily="18" charset="0"/>
+              </a:rPr>
+              <a:t>Universidad del Rosario - Faculty of Economics</a:t>
+            </a:r>
+          </a:p>
+          <a:p>
+            <a:pPr algn="l"/>
+            <a:r>
+              <a:rPr lang="en-US" sz="800" dirty="0">
+                <a:solidFill>
+                  <a:schemeClr val="tx1">
+                    <a:lumMod val="75000"/>
+                    <a:lumOff val="25000"/>
+                  </a:schemeClr>
+                </a:solidFill>
+                <a:latin typeface="Times New Roman" panose="02020603050405020304" pitchFamily="18" charset="0"/>
+                <a:cs typeface="Times New Roman" panose="02020603050405020304" pitchFamily="18" charset="0"/>
+              </a:rPr>
+              <a:t>Guibor Camargo</a:t>
+            </a:r>
+          </a:p>
+        </p:txBody>
+      </p:sp>
+      <p:pic>
+        <p:nvPicPr>
+          <p:cNvPr id="3" name="Picture 2" descr="A picture containing calendar&#10;&#10;Description automatically generated">
+            <a:extLst>
+              <a:ext uri="{FF2B5EF4-FFF2-40B4-BE49-F238E27FC236}">
+                <a16:creationId xmlns:a16="http://schemas.microsoft.com/office/drawing/2014/main" id="{2F6EA46D-1407-4DE4-E77F-85C780891B32}"/>
+              </a:ext>
+            </a:extLst>
+          </p:cNvPr>
+          <p:cNvPicPr>
+            <a:picLocks noChangeAspect="1"/>
+          </p:cNvPicPr>
+          <p:nvPr/>
+        </p:nvPicPr>
+        <p:blipFill rotWithShape="1">
+          <a:blip r:embed="rId4">
+            <a:extLst>
+              <a:ext uri="{28A0092B-C50C-407E-A947-70E740481C1C}">
+                <a14:useLocalDpi xmlns:a14="http://schemas.microsoft.com/office/drawing/2010/main" val="0"/>
+              </a:ext>
+            </a:extLst>
+          </a:blip>
+          <a:srcRect t="2176" b="50453"/>
+          <a:stretch/>
+        </p:blipFill>
+        <p:spPr>
+          <a:xfrm>
+            <a:off x="229824" y="1861946"/>
+            <a:ext cx="5868957" cy="4024342"/>
+          </a:xfrm>
+          <a:prstGeom prst="rect">
+            <a:avLst/>
+          </a:prstGeom>
+        </p:spPr>
+      </p:pic>
+      <p:pic>
+        <p:nvPicPr>
+          <p:cNvPr id="4" name="Picture 3" descr="A picture containing calendar&#10;&#10;Description automatically generated">
+            <a:extLst>
+              <a:ext uri="{FF2B5EF4-FFF2-40B4-BE49-F238E27FC236}">
+                <a16:creationId xmlns:a16="http://schemas.microsoft.com/office/drawing/2014/main" id="{2CC56E3A-4591-5C96-C397-3E3BADCBF47A}"/>
+              </a:ext>
+            </a:extLst>
+          </p:cNvPr>
+          <p:cNvPicPr>
+            <a:picLocks noChangeAspect="1"/>
+          </p:cNvPicPr>
+          <p:nvPr/>
+        </p:nvPicPr>
+        <p:blipFill rotWithShape="1">
+          <a:blip r:embed="rId4">
+            <a:extLst>
+              <a:ext uri="{28A0092B-C50C-407E-A947-70E740481C1C}">
+                <a14:useLocalDpi xmlns:a14="http://schemas.microsoft.com/office/drawing/2010/main" val="0"/>
+              </a:ext>
+            </a:extLst>
+          </a:blip>
+          <a:srcRect t="49070" b="3559"/>
+          <a:stretch/>
+        </p:blipFill>
+        <p:spPr>
+          <a:xfrm>
+            <a:off x="6159740" y="1861946"/>
+            <a:ext cx="5868957" cy="4024342"/>
+          </a:xfrm>
+          <a:prstGeom prst="rect">
+            <a:avLst/>
+          </a:prstGeom>
+        </p:spPr>
+      </p:pic>
+      <p:sp>
+        <p:nvSpPr>
+          <p:cNvPr id="5" name="TextBox 4">
+            <a:extLst>
+              <a:ext uri="{FF2B5EF4-FFF2-40B4-BE49-F238E27FC236}">
+                <a16:creationId xmlns:a16="http://schemas.microsoft.com/office/drawing/2014/main" id="{AEE7F92A-56CC-1F4E-1A29-1C06E250A7B6}"/>
+              </a:ext>
+            </a:extLst>
+          </p:cNvPr>
+          <p:cNvSpPr txBox="1"/>
+          <p:nvPr/>
+        </p:nvSpPr>
+        <p:spPr>
+          <a:xfrm>
+            <a:off x="1555347" y="1253053"/>
+            <a:ext cx="3455268" cy="338554"/>
+          </a:xfrm>
+          <a:prstGeom prst="rect">
+            <a:avLst/>
+          </a:prstGeom>
+          <a:noFill/>
+        </p:spPr>
+        <p:txBody>
+          <a:bodyPr wrap="square" rtlCol="0">
+            <a:spAutoFit/>
+          </a:bodyPr>
+          <a:lstStyle/>
+          <a:p>
+            <a:r>
+              <a:rPr lang="en-US" sz="1600" dirty="0">
+                <a:latin typeface="Times New Roman" panose="02020603050405020304" pitchFamily="18" charset="0"/>
+                <a:cs typeface="Times New Roman" panose="02020603050405020304" pitchFamily="18" charset="0"/>
+              </a:rPr>
+              <a:t>Pre-Constitutional Court Intervention</a:t>
+            </a:r>
+            <a:endParaRPr lang="en-US" sz="1000" dirty="0">
+              <a:latin typeface="Times New Roman" panose="02020603050405020304" pitchFamily="18" charset="0"/>
+              <a:cs typeface="Times New Roman" panose="02020603050405020304" pitchFamily="18" charset="0"/>
+            </a:endParaRPr>
+          </a:p>
+        </p:txBody>
+      </p:sp>
+      <p:sp>
+        <p:nvSpPr>
+          <p:cNvPr id="6" name="TextBox 5">
+            <a:extLst>
+              <a:ext uri="{FF2B5EF4-FFF2-40B4-BE49-F238E27FC236}">
+                <a16:creationId xmlns:a16="http://schemas.microsoft.com/office/drawing/2014/main" id="{C058BCDA-631F-AB9A-6D94-F6621A9DE215}"/>
+              </a:ext>
+            </a:extLst>
+          </p:cNvPr>
+          <p:cNvSpPr txBox="1"/>
+          <p:nvPr/>
+        </p:nvSpPr>
+        <p:spPr>
+          <a:xfrm>
+            <a:off x="7465989" y="1252197"/>
+            <a:ext cx="3455268" cy="338554"/>
+          </a:xfrm>
+          <a:prstGeom prst="rect">
+            <a:avLst/>
+          </a:prstGeom>
+          <a:noFill/>
+        </p:spPr>
+        <p:txBody>
+          <a:bodyPr wrap="square" rtlCol="0">
+            <a:spAutoFit/>
+          </a:bodyPr>
+          <a:lstStyle/>
+          <a:p>
+            <a:r>
+              <a:rPr lang="en-US" sz="1600" dirty="0">
+                <a:latin typeface="Times New Roman" panose="02020603050405020304" pitchFamily="18" charset="0"/>
+                <a:cs typeface="Times New Roman" panose="02020603050405020304" pitchFamily="18" charset="0"/>
+              </a:rPr>
+              <a:t>Post-Constitutional Court Intervention</a:t>
+            </a:r>
+            <a:endParaRPr lang="en-US" sz="1000" dirty="0">
+              <a:latin typeface="Times New Roman" panose="02020603050405020304" pitchFamily="18" charset="0"/>
+              <a:cs typeface="Times New Roman" panose="02020603050405020304" pitchFamily="18" charset="0"/>
+            </a:endParaRPr>
+          </a:p>
+        </p:txBody>
+      </p:sp>
+      <p:sp>
+        <p:nvSpPr>
+          <p:cNvPr id="7" name="TextBox 6">
+            <a:extLst>
+              <a:ext uri="{FF2B5EF4-FFF2-40B4-BE49-F238E27FC236}">
+                <a16:creationId xmlns:a16="http://schemas.microsoft.com/office/drawing/2014/main" id="{B9BE923A-F592-7B69-014B-CB7FDEB92FBB}"/>
+              </a:ext>
+            </a:extLst>
+          </p:cNvPr>
+          <p:cNvSpPr txBox="1"/>
+          <p:nvPr/>
+        </p:nvSpPr>
+        <p:spPr>
+          <a:xfrm>
+            <a:off x="13009" y="366598"/>
+            <a:ext cx="4395440" cy="461665"/>
+          </a:xfrm>
+          <a:prstGeom prst="rect">
+            <a:avLst/>
+          </a:prstGeom>
+          <a:noFill/>
+        </p:spPr>
+        <p:txBody>
+          <a:bodyPr wrap="square" rtlCol="0">
+            <a:spAutoFit/>
+          </a:bodyPr>
+          <a:lstStyle/>
+          <a:p>
+            <a:r>
+              <a:rPr lang="en-US" sz="800" b="1" dirty="0">
+                <a:latin typeface="Times New Roman" panose="02020603050405020304" pitchFamily="18" charset="0"/>
+                <a:cs typeface="Times New Roman" panose="02020603050405020304" pitchFamily="18" charset="0"/>
+              </a:rPr>
+              <a:t>R1: </a:t>
+            </a:r>
+          </a:p>
+          <a:p>
+            <a:r>
+              <a:rPr lang="en-US" sz="800" dirty="0">
+                <a:latin typeface="Times New Roman" panose="02020603050405020304" pitchFamily="18" charset="0"/>
+                <a:cs typeface="Times New Roman" panose="02020603050405020304" pitchFamily="18" charset="0"/>
+              </a:rPr>
+              <a:t>- Unconditional estimation</a:t>
+            </a:r>
+          </a:p>
+          <a:p>
+            <a:r>
+              <a:rPr lang="en-US" sz="800" dirty="0">
+                <a:latin typeface="Times New Roman" panose="02020603050405020304" pitchFamily="18" charset="0"/>
+                <a:cs typeface="Times New Roman" panose="02020603050405020304" pitchFamily="18" charset="0"/>
+              </a:rPr>
+              <a:t>- All controls and always monitored units</a:t>
+            </a:r>
+            <a:endParaRPr lang="en-US" sz="300" dirty="0">
+              <a:latin typeface="Times New Roman" panose="02020603050405020304" pitchFamily="18" charset="0"/>
+              <a:cs typeface="Times New Roman" panose="02020603050405020304" pitchFamily="18" charset="0"/>
+            </a:endParaRPr>
+          </a:p>
+        </p:txBody>
+      </p:sp>
+    </p:spTree>
+    <p:extLst>
+      <p:ext uri="{BB962C8B-B14F-4D97-AF65-F5344CB8AC3E}">
+        <p14:creationId xmlns:p14="http://schemas.microsoft.com/office/powerpoint/2010/main" val="3868716963"/>
+      </p:ext>
+    </p:extLst>
+  </p:cSld>
+  <p:clrMapOvr>
+    <a:masterClrMapping/>
+  </p:clrMapOvr>
+</p:sld>
+</file>
+
+<file path=ppt/slides/slide15.xml><?xml version="1.0" encoding="utf-8"?>
+<p:sld xmlns:a="http://schemas.openxmlformats.org/drawingml/2006/main" xmlns:r="http://schemas.openxmlformats.org/officeDocument/2006/relationships" xmlns:p="http://schemas.openxmlformats.org/presentationml/2006/main">
+  <p:cSld>
+    <p:spTree>
+      <p:nvGrpSpPr>
+        <p:cNvPr id="1" name=""/>
+        <p:cNvGrpSpPr/>
+        <p:nvPr/>
+      </p:nvGrpSpPr>
+      <p:grpSpPr>
+        <a:xfrm>
+          <a:off x="0" y="0"/>
+          <a:ext cx="0" cy="0"/>
+          <a:chOff x="0" y="0"/>
+          <a:chExt cx="0" cy="0"/>
+        </a:xfrm>
+      </p:grpSpPr>
+      <p:pic>
+        <p:nvPicPr>
+          <p:cNvPr id="18" name="Picture 17">
+            <a:extLst>
+              <a:ext uri="{FF2B5EF4-FFF2-40B4-BE49-F238E27FC236}">
+                <a16:creationId xmlns:a16="http://schemas.microsoft.com/office/drawing/2014/main" id="{755F0031-30C0-36D6-4A37-9B689C30C53A}"/>
+              </a:ext>
+            </a:extLst>
+          </p:cNvPr>
+          <p:cNvPicPr>
+            <a:picLocks noChangeAspect="1"/>
+          </p:cNvPicPr>
+          <p:nvPr/>
+        </p:nvPicPr>
+        <p:blipFill rotWithShape="1">
+          <a:blip r:embed="rId2">
+            <a:extLst>
+              <a:ext uri="{BEBA8EAE-BF5A-486C-A8C5-ECC9F3942E4B}">
+                <a14:imgProps xmlns:a14="http://schemas.microsoft.com/office/drawing/2010/main">
+                  <a14:imgLayer r:embed="rId3">
+                    <a14:imgEffect>
+                      <a14:brightnessContrast contrast="-20000"/>
+                    </a14:imgEffect>
+                  </a14:imgLayer>
+                </a14:imgProps>
+              </a:ext>
+            </a:extLst>
+          </a:blip>
+          <a:srcRect t="50147" b="2767"/>
+          <a:stretch/>
+        </p:blipFill>
+        <p:spPr>
+          <a:xfrm>
+            <a:off x="0" y="6385560"/>
+            <a:ext cx="12192000" cy="472440"/>
+          </a:xfrm>
+          <a:prstGeom prst="rect">
+            <a:avLst/>
+          </a:prstGeom>
+        </p:spPr>
+      </p:pic>
+      <p:sp>
+        <p:nvSpPr>
+          <p:cNvPr id="20" name="Footer Placeholder 19">
+            <a:extLst>
+              <a:ext uri="{FF2B5EF4-FFF2-40B4-BE49-F238E27FC236}">
+                <a16:creationId xmlns:a16="http://schemas.microsoft.com/office/drawing/2014/main" id="{16C6EE1C-B4C5-63DB-FDD9-2E5174F14162}"/>
+              </a:ext>
+            </a:extLst>
+          </p:cNvPr>
+          <p:cNvSpPr>
+            <a:spLocks noGrp="1"/>
+          </p:cNvSpPr>
+          <p:nvPr>
+            <p:ph type="ftr" sz="quarter" idx="11"/>
+          </p:nvPr>
+        </p:nvSpPr>
+        <p:spPr>
+          <a:xfrm>
+            <a:off x="9845040" y="6425931"/>
+            <a:ext cx="2092960" cy="365125"/>
+          </a:xfrm>
+        </p:spPr>
+        <p:txBody>
+          <a:bodyPr/>
+          <a:lstStyle/>
+          <a:p>
+            <a:pPr algn="r"/>
+            <a:r>
+              <a:rPr lang="en-US" sz="800" dirty="0">
+                <a:solidFill>
+                  <a:schemeClr val="tx1">
+                    <a:lumMod val="75000"/>
+                    <a:lumOff val="25000"/>
+                  </a:schemeClr>
+                </a:solidFill>
+                <a:latin typeface="Times New Roman" panose="02020603050405020304" pitchFamily="18" charset="0"/>
+                <a:cs typeface="Times New Roman" panose="02020603050405020304" pitchFamily="18" charset="0"/>
+              </a:rPr>
+              <a:t>The effect of neighborhood legalization on Bogotá’s informal growth</a:t>
+            </a:r>
+          </a:p>
+        </p:txBody>
+      </p:sp>
+      <p:sp>
+        <p:nvSpPr>
+          <p:cNvPr id="21" name="Slide Number Placeholder 20">
+            <a:extLst>
+              <a:ext uri="{FF2B5EF4-FFF2-40B4-BE49-F238E27FC236}">
+                <a16:creationId xmlns:a16="http://schemas.microsoft.com/office/drawing/2014/main" id="{43B8C7C9-117E-9253-C187-A3DE4A68EB5E}"/>
+              </a:ext>
+            </a:extLst>
+          </p:cNvPr>
+          <p:cNvSpPr>
+            <a:spLocks noGrp="1"/>
+          </p:cNvSpPr>
+          <p:nvPr>
+            <p:ph type="sldNum" sz="quarter" idx="12"/>
+          </p:nvPr>
+        </p:nvSpPr>
+        <p:spPr>
+          <a:xfrm>
+            <a:off x="11805920" y="6425932"/>
+            <a:ext cx="386080" cy="365125"/>
+          </a:xfrm>
+        </p:spPr>
+        <p:txBody>
+          <a:bodyPr/>
+          <a:lstStyle/>
+          <a:p>
+            <a:fld id="{2A4C3AE7-3FF8-4E88-8B99-ADBFDD32DDE0}" type="slidenum">
+              <a:rPr lang="en-US" b="1" smtClean="0">
+                <a:solidFill>
+                  <a:schemeClr val="tx1">
+                    <a:lumMod val="65000"/>
+                    <a:lumOff val="35000"/>
+                  </a:schemeClr>
+                </a:solidFill>
+                <a:latin typeface="Times New Roman" panose="02020603050405020304" pitchFamily="18" charset="0"/>
+                <a:cs typeface="Times New Roman" panose="02020603050405020304" pitchFamily="18" charset="0"/>
+              </a:rPr>
+              <a:t>15</a:t>
+            </a:fld>
+            <a:endParaRPr lang="en-US" b="1" dirty="0">
+              <a:solidFill>
+                <a:schemeClr val="tx1">
+                  <a:lumMod val="65000"/>
+                  <a:lumOff val="35000"/>
+                </a:schemeClr>
+              </a:solidFill>
+              <a:latin typeface="Times New Roman" panose="02020603050405020304" pitchFamily="18" charset="0"/>
+              <a:cs typeface="Times New Roman" panose="02020603050405020304" pitchFamily="18" charset="0"/>
+            </a:endParaRPr>
+          </a:p>
+        </p:txBody>
+      </p:sp>
+      <p:cxnSp>
+        <p:nvCxnSpPr>
+          <p:cNvPr id="24" name="Straight Connector 23">
+            <a:extLst>
+              <a:ext uri="{FF2B5EF4-FFF2-40B4-BE49-F238E27FC236}">
+                <a16:creationId xmlns:a16="http://schemas.microsoft.com/office/drawing/2014/main" id="{54F913B5-02C0-0E8C-67FD-C40042FE88B1}"/>
+              </a:ext>
+            </a:extLst>
+          </p:cNvPr>
+          <p:cNvCxnSpPr/>
+          <p:nvPr/>
+        </p:nvCxnSpPr>
+        <p:spPr>
+          <a:xfrm>
+            <a:off x="0" y="328990"/>
+            <a:ext cx="3759200" cy="0"/>
+          </a:xfrm>
+          <a:prstGeom prst="line">
+            <a:avLst/>
+          </a:prstGeom>
+          <a:ln>
+            <a:solidFill>
+              <a:schemeClr val="tx1">
+                <a:lumMod val="50000"/>
+                <a:lumOff val="50000"/>
+              </a:schemeClr>
+            </a:solidFill>
+          </a:ln>
+        </p:spPr>
+        <p:style>
+          <a:lnRef idx="1">
+            <a:schemeClr val="accent1"/>
+          </a:lnRef>
+          <a:fillRef idx="0">
+            <a:schemeClr val="accent1"/>
+          </a:fillRef>
+          <a:effectRef idx="0">
+            <a:schemeClr val="accent1"/>
+          </a:effectRef>
+          <a:fontRef idx="minor">
+            <a:schemeClr val="tx1"/>
+          </a:fontRef>
+        </p:style>
+      </p:cxnSp>
+      <p:sp>
+        <p:nvSpPr>
+          <p:cNvPr id="26" name="TextBox 25">
+            <a:extLst>
+              <a:ext uri="{FF2B5EF4-FFF2-40B4-BE49-F238E27FC236}">
+                <a16:creationId xmlns:a16="http://schemas.microsoft.com/office/drawing/2014/main" id="{0980D4F8-F9A4-5B77-F1B2-5F98FF6D54DC}"/>
+              </a:ext>
+            </a:extLst>
+          </p:cNvPr>
+          <p:cNvSpPr txBox="1"/>
+          <p:nvPr/>
+        </p:nvSpPr>
+        <p:spPr>
+          <a:xfrm>
+            <a:off x="-35560" y="-60960"/>
+            <a:ext cx="2844800" cy="461665"/>
+          </a:xfrm>
+          <a:prstGeom prst="rect">
+            <a:avLst/>
+          </a:prstGeom>
+          <a:noFill/>
+        </p:spPr>
+        <p:txBody>
+          <a:bodyPr wrap="square" rtlCol="0">
+            <a:spAutoFit/>
+          </a:bodyPr>
+          <a:lstStyle/>
+          <a:p>
+            <a:r>
+              <a:rPr lang="en-US" sz="2400" dirty="0">
+                <a:latin typeface="Times New Roman" panose="02020603050405020304" pitchFamily="18" charset="0"/>
+                <a:cs typeface="Times New Roman" panose="02020603050405020304" pitchFamily="18" charset="0"/>
+              </a:rPr>
+              <a:t>R</a:t>
+            </a:r>
+            <a:r>
+              <a:rPr lang="en-US" sz="1600" dirty="0">
+                <a:latin typeface="Times New Roman" panose="02020603050405020304" pitchFamily="18" charset="0"/>
+                <a:cs typeface="Times New Roman" panose="02020603050405020304" pitchFamily="18" charset="0"/>
+              </a:rPr>
+              <a:t>esults</a:t>
+            </a:r>
+            <a:endParaRPr lang="en-US" sz="1000" dirty="0">
+              <a:latin typeface="Times New Roman" panose="02020603050405020304" pitchFamily="18" charset="0"/>
+              <a:cs typeface="Times New Roman" panose="02020603050405020304" pitchFamily="18" charset="0"/>
+            </a:endParaRPr>
+          </a:p>
+        </p:txBody>
+      </p:sp>
+      <p:sp>
+        <p:nvSpPr>
+          <p:cNvPr id="27" name="Footer Placeholder 19">
+            <a:extLst>
+              <a:ext uri="{FF2B5EF4-FFF2-40B4-BE49-F238E27FC236}">
+                <a16:creationId xmlns:a16="http://schemas.microsoft.com/office/drawing/2014/main" id="{E56119E7-DDAB-699C-01DB-261EAC7CC30A}"/>
+              </a:ext>
+            </a:extLst>
+          </p:cNvPr>
+          <p:cNvSpPr txBox="1">
+            <a:spLocks/>
+          </p:cNvSpPr>
+          <p:nvPr/>
+        </p:nvSpPr>
+        <p:spPr>
+          <a:xfrm>
+            <a:off x="0" y="6439217"/>
+            <a:ext cx="2316480" cy="365125"/>
+          </a:xfrm>
+          <a:prstGeom prst="rect">
+            <a:avLst/>
+          </a:prstGeom>
+        </p:spPr>
+        <p:txBody>
+          <a:bodyPr vert="horz" lIns="91440" tIns="45720" rIns="91440" bIns="45720" rtlCol="0" anchor="ctr"/>
+          <a:lstStyle>
+            <a:defPPr>
+              <a:defRPr lang="en-US"/>
+            </a:defPPr>
+            <a:lvl1pPr marL="0" algn="ctr" defTabSz="914400" rtl="0" eaLnBrk="1" latinLnBrk="0" hangingPunct="1">
+              <a:defRPr sz="1200" kern="1200">
+                <a:solidFill>
+                  <a:schemeClr val="tx1">
+                    <a:tint val="75000"/>
+                  </a:schemeClr>
+                </a:solidFill>
+                <a:latin typeface="+mn-lt"/>
+                <a:ea typeface="+mn-ea"/>
+                <a:cs typeface="+mn-cs"/>
+              </a:defRPr>
+            </a:lvl1pPr>
+            <a:lvl2pPr marL="457200" algn="l" defTabSz="914400" rtl="0" eaLnBrk="1" latinLnBrk="0" hangingPunct="1">
+              <a:defRPr sz="1800" kern="1200">
+                <a:solidFill>
+                  <a:schemeClr val="tx1"/>
+                </a:solidFill>
+                <a:latin typeface="+mn-lt"/>
+                <a:ea typeface="+mn-ea"/>
+                <a:cs typeface="+mn-cs"/>
+              </a:defRPr>
+            </a:lvl2pPr>
+            <a:lvl3pPr marL="914400" algn="l" defTabSz="914400" rtl="0" eaLnBrk="1" latinLnBrk="0" hangingPunct="1">
+              <a:defRPr sz="1800" kern="1200">
+                <a:solidFill>
+                  <a:schemeClr val="tx1"/>
+                </a:solidFill>
+                <a:latin typeface="+mn-lt"/>
+                <a:ea typeface="+mn-ea"/>
+                <a:cs typeface="+mn-cs"/>
+              </a:defRPr>
+            </a:lvl3pPr>
+            <a:lvl4pPr marL="1371600" algn="l" defTabSz="914400" rtl="0" eaLnBrk="1" latinLnBrk="0" hangingPunct="1">
+              <a:defRPr sz="1800" kern="1200">
+                <a:solidFill>
+                  <a:schemeClr val="tx1"/>
+                </a:solidFill>
+                <a:latin typeface="+mn-lt"/>
+                <a:ea typeface="+mn-ea"/>
+                <a:cs typeface="+mn-cs"/>
+              </a:defRPr>
+            </a:lvl4pPr>
+            <a:lvl5pPr marL="1828800" algn="l" defTabSz="914400" rtl="0" eaLnBrk="1" latinLnBrk="0" hangingPunct="1">
+              <a:defRPr sz="1800" kern="1200">
+                <a:solidFill>
+                  <a:schemeClr val="tx1"/>
+                </a:solidFill>
+                <a:latin typeface="+mn-lt"/>
+                <a:ea typeface="+mn-ea"/>
+                <a:cs typeface="+mn-cs"/>
+              </a:defRPr>
+            </a:lvl5pPr>
+            <a:lvl6pPr marL="2286000" algn="l" defTabSz="914400" rtl="0" eaLnBrk="1" latinLnBrk="0" hangingPunct="1">
+              <a:defRPr sz="1800" kern="1200">
+                <a:solidFill>
+                  <a:schemeClr val="tx1"/>
+                </a:solidFill>
+                <a:latin typeface="+mn-lt"/>
+                <a:ea typeface="+mn-ea"/>
+                <a:cs typeface="+mn-cs"/>
+              </a:defRPr>
+            </a:lvl6pPr>
+            <a:lvl7pPr marL="2743200" algn="l" defTabSz="914400" rtl="0" eaLnBrk="1" latinLnBrk="0" hangingPunct="1">
+              <a:defRPr sz="1800" kern="1200">
+                <a:solidFill>
+                  <a:schemeClr val="tx1"/>
+                </a:solidFill>
+                <a:latin typeface="+mn-lt"/>
+                <a:ea typeface="+mn-ea"/>
+                <a:cs typeface="+mn-cs"/>
+              </a:defRPr>
+            </a:lvl7pPr>
+            <a:lvl8pPr marL="3200400" algn="l" defTabSz="914400" rtl="0" eaLnBrk="1" latinLnBrk="0" hangingPunct="1">
+              <a:defRPr sz="1800" kern="1200">
+                <a:solidFill>
+                  <a:schemeClr val="tx1"/>
+                </a:solidFill>
+                <a:latin typeface="+mn-lt"/>
+                <a:ea typeface="+mn-ea"/>
+                <a:cs typeface="+mn-cs"/>
+              </a:defRPr>
+            </a:lvl8pPr>
+            <a:lvl9pPr marL="3657600" algn="l" defTabSz="914400" rtl="0" eaLnBrk="1" latinLnBrk="0" hangingPunct="1">
+              <a:defRPr sz="1800" kern="1200">
+                <a:solidFill>
+                  <a:schemeClr val="tx1"/>
+                </a:solidFill>
+                <a:latin typeface="+mn-lt"/>
+                <a:ea typeface="+mn-ea"/>
+                <a:cs typeface="+mn-cs"/>
+              </a:defRPr>
+            </a:lvl9pPr>
+          </a:lstStyle>
+          <a:p>
+            <a:pPr algn="l"/>
+            <a:r>
+              <a:rPr lang="en-US" sz="800" dirty="0">
+                <a:solidFill>
+                  <a:schemeClr val="tx1">
+                    <a:lumMod val="75000"/>
+                    <a:lumOff val="25000"/>
+                  </a:schemeClr>
+                </a:solidFill>
+                <a:latin typeface="Times New Roman" panose="02020603050405020304" pitchFamily="18" charset="0"/>
+                <a:cs typeface="Times New Roman" panose="02020603050405020304" pitchFamily="18" charset="0"/>
+              </a:rPr>
+              <a:t>Universidad del Rosario - Faculty of Economics</a:t>
+            </a:r>
+          </a:p>
+          <a:p>
+            <a:pPr algn="l"/>
+            <a:r>
+              <a:rPr lang="en-US" sz="800" dirty="0">
+                <a:solidFill>
+                  <a:schemeClr val="tx1">
+                    <a:lumMod val="75000"/>
+                    <a:lumOff val="25000"/>
+                  </a:schemeClr>
+                </a:solidFill>
+                <a:latin typeface="Times New Roman" panose="02020603050405020304" pitchFamily="18" charset="0"/>
+                <a:cs typeface="Times New Roman" panose="02020603050405020304" pitchFamily="18" charset="0"/>
+              </a:rPr>
+              <a:t>Guibor Camargo</a:t>
+            </a:r>
+          </a:p>
+        </p:txBody>
+      </p:sp>
+      <p:sp>
+        <p:nvSpPr>
+          <p:cNvPr id="5" name="TextBox 4">
+            <a:extLst>
+              <a:ext uri="{FF2B5EF4-FFF2-40B4-BE49-F238E27FC236}">
+                <a16:creationId xmlns:a16="http://schemas.microsoft.com/office/drawing/2014/main" id="{AEE7F92A-56CC-1F4E-1A29-1C06E250A7B6}"/>
+              </a:ext>
+            </a:extLst>
+          </p:cNvPr>
+          <p:cNvSpPr txBox="1"/>
+          <p:nvPr/>
+        </p:nvSpPr>
+        <p:spPr>
+          <a:xfrm>
+            <a:off x="1555347" y="1253053"/>
+            <a:ext cx="3455268" cy="338554"/>
+          </a:xfrm>
+          <a:prstGeom prst="rect">
+            <a:avLst/>
+          </a:prstGeom>
+          <a:noFill/>
+        </p:spPr>
+        <p:txBody>
+          <a:bodyPr wrap="square" rtlCol="0">
+            <a:spAutoFit/>
+          </a:bodyPr>
+          <a:lstStyle/>
+          <a:p>
+            <a:r>
+              <a:rPr lang="en-US" sz="1600" dirty="0">
+                <a:latin typeface="Times New Roman" panose="02020603050405020304" pitchFamily="18" charset="0"/>
+                <a:cs typeface="Times New Roman" panose="02020603050405020304" pitchFamily="18" charset="0"/>
+              </a:rPr>
+              <a:t>Pre-Constitutional Court Intervention</a:t>
+            </a:r>
+            <a:endParaRPr lang="en-US" sz="1000" dirty="0">
+              <a:latin typeface="Times New Roman" panose="02020603050405020304" pitchFamily="18" charset="0"/>
+              <a:cs typeface="Times New Roman" panose="02020603050405020304" pitchFamily="18" charset="0"/>
+            </a:endParaRPr>
+          </a:p>
+        </p:txBody>
+      </p:sp>
+      <p:sp>
+        <p:nvSpPr>
+          <p:cNvPr id="6" name="TextBox 5">
+            <a:extLst>
+              <a:ext uri="{FF2B5EF4-FFF2-40B4-BE49-F238E27FC236}">
+                <a16:creationId xmlns:a16="http://schemas.microsoft.com/office/drawing/2014/main" id="{C058BCDA-631F-AB9A-6D94-F6621A9DE215}"/>
+              </a:ext>
+            </a:extLst>
+          </p:cNvPr>
+          <p:cNvSpPr txBox="1"/>
+          <p:nvPr/>
+        </p:nvSpPr>
+        <p:spPr>
+          <a:xfrm>
+            <a:off x="7465989" y="1252197"/>
+            <a:ext cx="3455268" cy="338554"/>
+          </a:xfrm>
+          <a:prstGeom prst="rect">
+            <a:avLst/>
+          </a:prstGeom>
+          <a:noFill/>
+        </p:spPr>
+        <p:txBody>
+          <a:bodyPr wrap="square" rtlCol="0">
+            <a:spAutoFit/>
+          </a:bodyPr>
+          <a:lstStyle/>
+          <a:p>
+            <a:r>
+              <a:rPr lang="en-US" sz="1600" dirty="0">
+                <a:latin typeface="Times New Roman" panose="02020603050405020304" pitchFamily="18" charset="0"/>
+                <a:cs typeface="Times New Roman" panose="02020603050405020304" pitchFamily="18" charset="0"/>
+              </a:rPr>
+              <a:t>Post-Constitutional Court Intervention</a:t>
+            </a:r>
+            <a:endParaRPr lang="en-US" sz="1000" dirty="0">
+              <a:latin typeface="Times New Roman" panose="02020603050405020304" pitchFamily="18" charset="0"/>
+              <a:cs typeface="Times New Roman" panose="02020603050405020304" pitchFamily="18" charset="0"/>
+            </a:endParaRPr>
+          </a:p>
+        </p:txBody>
+      </p:sp>
+      <p:sp>
+        <p:nvSpPr>
+          <p:cNvPr id="7" name="TextBox 6">
+            <a:extLst>
+              <a:ext uri="{FF2B5EF4-FFF2-40B4-BE49-F238E27FC236}">
+                <a16:creationId xmlns:a16="http://schemas.microsoft.com/office/drawing/2014/main" id="{B9BE923A-F592-7B69-014B-CB7FDEB92FBB}"/>
+              </a:ext>
+            </a:extLst>
+          </p:cNvPr>
+          <p:cNvSpPr txBox="1"/>
+          <p:nvPr/>
+        </p:nvSpPr>
+        <p:spPr>
+          <a:xfrm>
+            <a:off x="13009" y="366598"/>
+            <a:ext cx="4395440" cy="461665"/>
+          </a:xfrm>
+          <a:prstGeom prst="rect">
+            <a:avLst/>
+          </a:prstGeom>
+          <a:noFill/>
+        </p:spPr>
+        <p:txBody>
+          <a:bodyPr wrap="square" rtlCol="0">
+            <a:spAutoFit/>
+          </a:bodyPr>
+          <a:lstStyle/>
+          <a:p>
+            <a:r>
+              <a:rPr lang="en-US" sz="800" b="1" dirty="0">
+                <a:latin typeface="Times New Roman" panose="02020603050405020304" pitchFamily="18" charset="0"/>
+                <a:cs typeface="Times New Roman" panose="02020603050405020304" pitchFamily="18" charset="0"/>
+              </a:rPr>
+              <a:t>R2: </a:t>
+            </a:r>
+          </a:p>
+          <a:p>
+            <a:r>
+              <a:rPr lang="en-US" sz="800" dirty="0">
+                <a:latin typeface="Times New Roman" panose="02020603050405020304" pitchFamily="18" charset="0"/>
+                <a:cs typeface="Times New Roman" panose="02020603050405020304" pitchFamily="18" charset="0"/>
+              </a:rPr>
+              <a:t>- Unconditional estimation</a:t>
+            </a:r>
+          </a:p>
+          <a:p>
+            <a:r>
+              <a:rPr lang="en-US" sz="800" dirty="0">
+                <a:latin typeface="Times New Roman" panose="02020603050405020304" pitchFamily="18" charset="0"/>
+                <a:cs typeface="Times New Roman" panose="02020603050405020304" pitchFamily="18" charset="0"/>
+              </a:rPr>
+              <a:t>- Only pure controls (</a:t>
+            </a:r>
+            <a:r>
+              <a:rPr lang="en-US" sz="800" i="1" dirty="0">
+                <a:latin typeface="Times New Roman" panose="02020603050405020304" pitchFamily="18" charset="0"/>
+                <a:cs typeface="Times New Roman" panose="02020603050405020304" pitchFamily="18" charset="0"/>
+              </a:rPr>
+              <a:t>outsiders</a:t>
+            </a:r>
+            <a:r>
+              <a:rPr lang="en-US" sz="800" dirty="0">
+                <a:latin typeface="Times New Roman" panose="02020603050405020304" pitchFamily="18" charset="0"/>
+                <a:cs typeface="Times New Roman" panose="02020603050405020304" pitchFamily="18" charset="0"/>
+              </a:rPr>
+              <a:t>) and always monitored units</a:t>
+            </a:r>
+            <a:endParaRPr lang="en-US" sz="300" dirty="0">
+              <a:latin typeface="Times New Roman" panose="02020603050405020304" pitchFamily="18" charset="0"/>
+              <a:cs typeface="Times New Roman" panose="02020603050405020304" pitchFamily="18" charset="0"/>
+            </a:endParaRPr>
+          </a:p>
+        </p:txBody>
+      </p:sp>
+      <p:pic>
+        <p:nvPicPr>
+          <p:cNvPr id="8" name="Picture 7" descr="A picture containing timeline&#10;&#10;Description automatically generated">
+            <a:extLst>
+              <a:ext uri="{FF2B5EF4-FFF2-40B4-BE49-F238E27FC236}">
+                <a16:creationId xmlns:a16="http://schemas.microsoft.com/office/drawing/2014/main" id="{C89661C2-3115-4387-7CFA-535C6A2510B7}"/>
+              </a:ext>
+            </a:extLst>
+          </p:cNvPr>
+          <p:cNvPicPr>
+            <a:picLocks noChangeAspect="1"/>
+          </p:cNvPicPr>
+          <p:nvPr/>
+        </p:nvPicPr>
+        <p:blipFill rotWithShape="1">
+          <a:blip r:embed="rId4">
+            <a:extLst>
+              <a:ext uri="{28A0092B-C50C-407E-A947-70E740481C1C}">
+                <a14:useLocalDpi xmlns:a14="http://schemas.microsoft.com/office/drawing/2010/main" val="0"/>
+              </a:ext>
+            </a:extLst>
+          </a:blip>
+          <a:srcRect t="2745" b="62401"/>
+          <a:stretch/>
+        </p:blipFill>
+        <p:spPr>
+          <a:xfrm>
+            <a:off x="238760" y="1778620"/>
+            <a:ext cx="5842000" cy="3869891"/>
+          </a:xfrm>
+          <a:prstGeom prst="rect">
+            <a:avLst/>
+          </a:prstGeom>
+        </p:spPr>
+      </p:pic>
+      <p:pic>
+        <p:nvPicPr>
+          <p:cNvPr id="9" name="Picture 8" descr="A picture containing timeline&#10;&#10;Description automatically generated">
+            <a:extLst>
+              <a:ext uri="{FF2B5EF4-FFF2-40B4-BE49-F238E27FC236}">
+                <a16:creationId xmlns:a16="http://schemas.microsoft.com/office/drawing/2014/main" id="{04975176-6B7C-42FA-2D1D-E748598EC8D9}"/>
+              </a:ext>
+            </a:extLst>
+          </p:cNvPr>
+          <p:cNvPicPr>
+            <a:picLocks noChangeAspect="1"/>
+          </p:cNvPicPr>
+          <p:nvPr/>
+        </p:nvPicPr>
+        <p:blipFill rotWithShape="1">
+          <a:blip r:embed="rId4">
+            <a:extLst>
+              <a:ext uri="{28A0092B-C50C-407E-A947-70E740481C1C}">
+                <a14:useLocalDpi xmlns:a14="http://schemas.microsoft.com/office/drawing/2010/main" val="0"/>
+              </a:ext>
+            </a:extLst>
+          </a:blip>
+          <a:srcRect t="48928"/>
+          <a:stretch/>
+        </p:blipFill>
+        <p:spPr>
+          <a:xfrm>
+            <a:off x="6528667" y="1631122"/>
+            <a:ext cx="4764297" cy="4624517"/>
+          </a:xfrm>
+          <a:prstGeom prst="rect">
+            <a:avLst/>
+          </a:prstGeom>
+        </p:spPr>
+      </p:pic>
+    </p:spTree>
+    <p:extLst>
+      <p:ext uri="{BB962C8B-B14F-4D97-AF65-F5344CB8AC3E}">
+        <p14:creationId xmlns:p14="http://schemas.microsoft.com/office/powerpoint/2010/main" val="2475026445"/>
+      </p:ext>
+    </p:extLst>
+  </p:cSld>
+  <p:clrMapOvr>
+    <a:masterClrMapping/>
+  </p:clrMapOvr>
+</p:sld>
+</file>
+
+<file path=ppt/slides/slide16.xml><?xml version="1.0" encoding="utf-8"?>
+<p:sld xmlns:a="http://schemas.openxmlformats.org/drawingml/2006/main" xmlns:r="http://schemas.openxmlformats.org/officeDocument/2006/relationships" xmlns:p="http://schemas.openxmlformats.org/presentationml/2006/main">
+  <p:cSld>
+    <p:spTree>
+      <p:nvGrpSpPr>
+        <p:cNvPr id="1" name=""/>
+        <p:cNvGrpSpPr/>
+        <p:nvPr/>
+      </p:nvGrpSpPr>
+      <p:grpSpPr>
+        <a:xfrm>
+          <a:off x="0" y="0"/>
+          <a:ext cx="0" cy="0"/>
+          <a:chOff x="0" y="0"/>
+          <a:chExt cx="0" cy="0"/>
+        </a:xfrm>
+      </p:grpSpPr>
+      <p:pic>
+        <p:nvPicPr>
+          <p:cNvPr id="18" name="Picture 17">
+            <a:extLst>
+              <a:ext uri="{FF2B5EF4-FFF2-40B4-BE49-F238E27FC236}">
+                <a16:creationId xmlns:a16="http://schemas.microsoft.com/office/drawing/2014/main" id="{755F0031-30C0-36D6-4A37-9B689C30C53A}"/>
+              </a:ext>
+            </a:extLst>
+          </p:cNvPr>
+          <p:cNvPicPr>
+            <a:picLocks noChangeAspect="1"/>
+          </p:cNvPicPr>
+          <p:nvPr/>
+        </p:nvPicPr>
+        <p:blipFill rotWithShape="1">
+          <a:blip r:embed="rId2">
+            <a:extLst>
+              <a:ext uri="{BEBA8EAE-BF5A-486C-A8C5-ECC9F3942E4B}">
+                <a14:imgProps xmlns:a14="http://schemas.microsoft.com/office/drawing/2010/main">
+                  <a14:imgLayer r:embed="rId3">
+                    <a14:imgEffect>
+                      <a14:brightnessContrast contrast="-20000"/>
+                    </a14:imgEffect>
+                  </a14:imgLayer>
+                </a14:imgProps>
+              </a:ext>
+            </a:extLst>
+          </a:blip>
+          <a:srcRect t="50147" b="2767"/>
+          <a:stretch/>
+        </p:blipFill>
+        <p:spPr>
+          <a:xfrm>
+            <a:off x="0" y="6385560"/>
+            <a:ext cx="12192000" cy="472440"/>
+          </a:xfrm>
+          <a:prstGeom prst="rect">
+            <a:avLst/>
+          </a:prstGeom>
+        </p:spPr>
+      </p:pic>
+      <p:sp>
+        <p:nvSpPr>
+          <p:cNvPr id="20" name="Footer Placeholder 19">
+            <a:extLst>
+              <a:ext uri="{FF2B5EF4-FFF2-40B4-BE49-F238E27FC236}">
+                <a16:creationId xmlns:a16="http://schemas.microsoft.com/office/drawing/2014/main" id="{16C6EE1C-B4C5-63DB-FDD9-2E5174F14162}"/>
+              </a:ext>
+            </a:extLst>
+          </p:cNvPr>
+          <p:cNvSpPr>
+            <a:spLocks noGrp="1"/>
+          </p:cNvSpPr>
+          <p:nvPr>
+            <p:ph type="ftr" sz="quarter" idx="11"/>
+          </p:nvPr>
+        </p:nvSpPr>
+        <p:spPr>
+          <a:xfrm>
+            <a:off x="9845040" y="6425931"/>
+            <a:ext cx="2092960" cy="365125"/>
+          </a:xfrm>
+        </p:spPr>
+        <p:txBody>
+          <a:bodyPr/>
+          <a:lstStyle/>
+          <a:p>
+            <a:pPr algn="r"/>
+            <a:r>
+              <a:rPr lang="en-US" sz="800" dirty="0">
+                <a:solidFill>
+                  <a:schemeClr val="tx1">
+                    <a:lumMod val="75000"/>
+                    <a:lumOff val="25000"/>
+                  </a:schemeClr>
+                </a:solidFill>
+                <a:latin typeface="Times New Roman" panose="02020603050405020304" pitchFamily="18" charset="0"/>
+                <a:cs typeface="Times New Roman" panose="02020603050405020304" pitchFamily="18" charset="0"/>
+              </a:rPr>
+              <a:t>The effect of neighborhood legalization on Bogotá’s informal growth</a:t>
+            </a:r>
+          </a:p>
+        </p:txBody>
+      </p:sp>
+      <p:sp>
+        <p:nvSpPr>
+          <p:cNvPr id="21" name="Slide Number Placeholder 20">
+            <a:extLst>
+              <a:ext uri="{FF2B5EF4-FFF2-40B4-BE49-F238E27FC236}">
+                <a16:creationId xmlns:a16="http://schemas.microsoft.com/office/drawing/2014/main" id="{43B8C7C9-117E-9253-C187-A3DE4A68EB5E}"/>
+              </a:ext>
+            </a:extLst>
+          </p:cNvPr>
+          <p:cNvSpPr>
+            <a:spLocks noGrp="1"/>
+          </p:cNvSpPr>
+          <p:nvPr>
+            <p:ph type="sldNum" sz="quarter" idx="12"/>
+          </p:nvPr>
+        </p:nvSpPr>
+        <p:spPr>
+          <a:xfrm>
+            <a:off x="11805920" y="6425932"/>
+            <a:ext cx="386080" cy="365125"/>
+          </a:xfrm>
+        </p:spPr>
+        <p:txBody>
+          <a:bodyPr/>
+          <a:lstStyle/>
+          <a:p>
+            <a:fld id="{2A4C3AE7-3FF8-4E88-8B99-ADBFDD32DDE0}" type="slidenum">
+              <a:rPr lang="en-US" b="1" smtClean="0">
+                <a:solidFill>
+                  <a:schemeClr val="tx1">
+                    <a:lumMod val="65000"/>
+                    <a:lumOff val="35000"/>
+                  </a:schemeClr>
+                </a:solidFill>
+                <a:latin typeface="Times New Roman" panose="02020603050405020304" pitchFamily="18" charset="0"/>
+                <a:cs typeface="Times New Roman" panose="02020603050405020304" pitchFamily="18" charset="0"/>
+              </a:rPr>
+              <a:t>16</a:t>
+            </a:fld>
+            <a:endParaRPr lang="en-US" b="1" dirty="0">
+              <a:solidFill>
+                <a:schemeClr val="tx1">
+                  <a:lumMod val="65000"/>
+                  <a:lumOff val="35000"/>
+                </a:schemeClr>
+              </a:solidFill>
+              <a:latin typeface="Times New Roman" panose="02020603050405020304" pitchFamily="18" charset="0"/>
+              <a:cs typeface="Times New Roman" panose="02020603050405020304" pitchFamily="18" charset="0"/>
+            </a:endParaRPr>
+          </a:p>
+        </p:txBody>
+      </p:sp>
+      <p:cxnSp>
+        <p:nvCxnSpPr>
+          <p:cNvPr id="24" name="Straight Connector 23">
+            <a:extLst>
+              <a:ext uri="{FF2B5EF4-FFF2-40B4-BE49-F238E27FC236}">
+                <a16:creationId xmlns:a16="http://schemas.microsoft.com/office/drawing/2014/main" id="{54F913B5-02C0-0E8C-67FD-C40042FE88B1}"/>
+              </a:ext>
+            </a:extLst>
+          </p:cNvPr>
+          <p:cNvCxnSpPr/>
+          <p:nvPr/>
+        </p:nvCxnSpPr>
+        <p:spPr>
+          <a:xfrm>
+            <a:off x="0" y="328990"/>
+            <a:ext cx="3759200" cy="0"/>
+          </a:xfrm>
+          <a:prstGeom prst="line">
+            <a:avLst/>
+          </a:prstGeom>
+          <a:ln>
+            <a:solidFill>
+              <a:schemeClr val="tx1">
+                <a:lumMod val="50000"/>
+                <a:lumOff val="50000"/>
+              </a:schemeClr>
+            </a:solidFill>
+          </a:ln>
+        </p:spPr>
+        <p:style>
+          <a:lnRef idx="1">
+            <a:schemeClr val="accent1"/>
+          </a:lnRef>
+          <a:fillRef idx="0">
+            <a:schemeClr val="accent1"/>
+          </a:fillRef>
+          <a:effectRef idx="0">
+            <a:schemeClr val="accent1"/>
+          </a:effectRef>
+          <a:fontRef idx="minor">
+            <a:schemeClr val="tx1"/>
+          </a:fontRef>
+        </p:style>
+      </p:cxnSp>
+      <p:sp>
+        <p:nvSpPr>
+          <p:cNvPr id="26" name="TextBox 25">
+            <a:extLst>
+              <a:ext uri="{FF2B5EF4-FFF2-40B4-BE49-F238E27FC236}">
+                <a16:creationId xmlns:a16="http://schemas.microsoft.com/office/drawing/2014/main" id="{0980D4F8-F9A4-5B77-F1B2-5F98FF6D54DC}"/>
+              </a:ext>
+            </a:extLst>
+          </p:cNvPr>
+          <p:cNvSpPr txBox="1"/>
+          <p:nvPr/>
+        </p:nvSpPr>
+        <p:spPr>
+          <a:xfrm>
+            <a:off x="-35560" y="-60960"/>
+            <a:ext cx="2844800" cy="461665"/>
+          </a:xfrm>
+          <a:prstGeom prst="rect">
+            <a:avLst/>
+          </a:prstGeom>
+          <a:noFill/>
+        </p:spPr>
+        <p:txBody>
+          <a:bodyPr wrap="square" rtlCol="0">
+            <a:spAutoFit/>
+          </a:bodyPr>
+          <a:lstStyle/>
+          <a:p>
+            <a:r>
+              <a:rPr lang="en-US" sz="2400" dirty="0">
+                <a:latin typeface="Times New Roman" panose="02020603050405020304" pitchFamily="18" charset="0"/>
+                <a:cs typeface="Times New Roman" panose="02020603050405020304" pitchFamily="18" charset="0"/>
+              </a:rPr>
+              <a:t>R</a:t>
+            </a:r>
+            <a:r>
+              <a:rPr lang="en-US" sz="1600" dirty="0">
+                <a:latin typeface="Times New Roman" panose="02020603050405020304" pitchFamily="18" charset="0"/>
+                <a:cs typeface="Times New Roman" panose="02020603050405020304" pitchFamily="18" charset="0"/>
+              </a:rPr>
+              <a:t>esults</a:t>
+            </a:r>
+            <a:endParaRPr lang="en-US" sz="1000" dirty="0">
+              <a:latin typeface="Times New Roman" panose="02020603050405020304" pitchFamily="18" charset="0"/>
+              <a:cs typeface="Times New Roman" panose="02020603050405020304" pitchFamily="18" charset="0"/>
+            </a:endParaRPr>
+          </a:p>
+        </p:txBody>
+      </p:sp>
+      <p:sp>
+        <p:nvSpPr>
+          <p:cNvPr id="27" name="Footer Placeholder 19">
+            <a:extLst>
+              <a:ext uri="{FF2B5EF4-FFF2-40B4-BE49-F238E27FC236}">
+                <a16:creationId xmlns:a16="http://schemas.microsoft.com/office/drawing/2014/main" id="{E56119E7-DDAB-699C-01DB-261EAC7CC30A}"/>
+              </a:ext>
+            </a:extLst>
+          </p:cNvPr>
+          <p:cNvSpPr txBox="1">
+            <a:spLocks/>
+          </p:cNvSpPr>
+          <p:nvPr/>
+        </p:nvSpPr>
+        <p:spPr>
+          <a:xfrm>
+            <a:off x="0" y="6439217"/>
+            <a:ext cx="2316480" cy="365125"/>
+          </a:xfrm>
+          <a:prstGeom prst="rect">
+            <a:avLst/>
+          </a:prstGeom>
+        </p:spPr>
+        <p:txBody>
+          <a:bodyPr vert="horz" lIns="91440" tIns="45720" rIns="91440" bIns="45720" rtlCol="0" anchor="ctr"/>
+          <a:lstStyle>
+            <a:defPPr>
+              <a:defRPr lang="en-US"/>
+            </a:defPPr>
+            <a:lvl1pPr marL="0" algn="ctr" defTabSz="914400" rtl="0" eaLnBrk="1" latinLnBrk="0" hangingPunct="1">
+              <a:defRPr sz="1200" kern="1200">
+                <a:solidFill>
+                  <a:schemeClr val="tx1">
+                    <a:tint val="75000"/>
+                  </a:schemeClr>
+                </a:solidFill>
+                <a:latin typeface="+mn-lt"/>
+                <a:ea typeface="+mn-ea"/>
+                <a:cs typeface="+mn-cs"/>
+              </a:defRPr>
+            </a:lvl1pPr>
+            <a:lvl2pPr marL="457200" algn="l" defTabSz="914400" rtl="0" eaLnBrk="1" latinLnBrk="0" hangingPunct="1">
+              <a:defRPr sz="1800" kern="1200">
+                <a:solidFill>
+                  <a:schemeClr val="tx1"/>
+                </a:solidFill>
+                <a:latin typeface="+mn-lt"/>
+                <a:ea typeface="+mn-ea"/>
+                <a:cs typeface="+mn-cs"/>
+              </a:defRPr>
+            </a:lvl2pPr>
+            <a:lvl3pPr marL="914400" algn="l" defTabSz="914400" rtl="0" eaLnBrk="1" latinLnBrk="0" hangingPunct="1">
+              <a:defRPr sz="1800" kern="1200">
+                <a:solidFill>
+                  <a:schemeClr val="tx1"/>
+                </a:solidFill>
+                <a:latin typeface="+mn-lt"/>
+                <a:ea typeface="+mn-ea"/>
+                <a:cs typeface="+mn-cs"/>
+              </a:defRPr>
+            </a:lvl3pPr>
+            <a:lvl4pPr marL="1371600" algn="l" defTabSz="914400" rtl="0" eaLnBrk="1" latinLnBrk="0" hangingPunct="1">
+              <a:defRPr sz="1800" kern="1200">
+                <a:solidFill>
+                  <a:schemeClr val="tx1"/>
+                </a:solidFill>
+                <a:latin typeface="+mn-lt"/>
+                <a:ea typeface="+mn-ea"/>
+                <a:cs typeface="+mn-cs"/>
+              </a:defRPr>
+            </a:lvl4pPr>
+            <a:lvl5pPr marL="1828800" algn="l" defTabSz="914400" rtl="0" eaLnBrk="1" latinLnBrk="0" hangingPunct="1">
+              <a:defRPr sz="1800" kern="1200">
+                <a:solidFill>
+                  <a:schemeClr val="tx1"/>
+                </a:solidFill>
+                <a:latin typeface="+mn-lt"/>
+                <a:ea typeface="+mn-ea"/>
+                <a:cs typeface="+mn-cs"/>
+              </a:defRPr>
+            </a:lvl5pPr>
+            <a:lvl6pPr marL="2286000" algn="l" defTabSz="914400" rtl="0" eaLnBrk="1" latinLnBrk="0" hangingPunct="1">
+              <a:defRPr sz="1800" kern="1200">
+                <a:solidFill>
+                  <a:schemeClr val="tx1"/>
+                </a:solidFill>
+                <a:latin typeface="+mn-lt"/>
+                <a:ea typeface="+mn-ea"/>
+                <a:cs typeface="+mn-cs"/>
+              </a:defRPr>
+            </a:lvl6pPr>
+            <a:lvl7pPr marL="2743200" algn="l" defTabSz="914400" rtl="0" eaLnBrk="1" latinLnBrk="0" hangingPunct="1">
+              <a:defRPr sz="1800" kern="1200">
+                <a:solidFill>
+                  <a:schemeClr val="tx1"/>
+                </a:solidFill>
+                <a:latin typeface="+mn-lt"/>
+                <a:ea typeface="+mn-ea"/>
+                <a:cs typeface="+mn-cs"/>
+              </a:defRPr>
+            </a:lvl7pPr>
+            <a:lvl8pPr marL="3200400" algn="l" defTabSz="914400" rtl="0" eaLnBrk="1" latinLnBrk="0" hangingPunct="1">
+              <a:defRPr sz="1800" kern="1200">
+                <a:solidFill>
+                  <a:schemeClr val="tx1"/>
+                </a:solidFill>
+                <a:latin typeface="+mn-lt"/>
+                <a:ea typeface="+mn-ea"/>
+                <a:cs typeface="+mn-cs"/>
+              </a:defRPr>
+            </a:lvl8pPr>
+            <a:lvl9pPr marL="3657600" algn="l" defTabSz="914400" rtl="0" eaLnBrk="1" latinLnBrk="0" hangingPunct="1">
+              <a:defRPr sz="1800" kern="1200">
+                <a:solidFill>
+                  <a:schemeClr val="tx1"/>
+                </a:solidFill>
+                <a:latin typeface="+mn-lt"/>
+                <a:ea typeface="+mn-ea"/>
+                <a:cs typeface="+mn-cs"/>
+              </a:defRPr>
+            </a:lvl9pPr>
+          </a:lstStyle>
+          <a:p>
+            <a:pPr algn="l"/>
+            <a:r>
+              <a:rPr lang="en-US" sz="800" dirty="0">
+                <a:solidFill>
+                  <a:schemeClr val="tx1">
+                    <a:lumMod val="75000"/>
+                    <a:lumOff val="25000"/>
+                  </a:schemeClr>
+                </a:solidFill>
+                <a:latin typeface="Times New Roman" panose="02020603050405020304" pitchFamily="18" charset="0"/>
+                <a:cs typeface="Times New Roman" panose="02020603050405020304" pitchFamily="18" charset="0"/>
+              </a:rPr>
+              <a:t>Universidad del Rosario - Faculty of Economics</a:t>
+            </a:r>
+          </a:p>
+          <a:p>
+            <a:pPr algn="l"/>
+            <a:r>
+              <a:rPr lang="en-US" sz="800" dirty="0">
+                <a:solidFill>
+                  <a:schemeClr val="tx1">
+                    <a:lumMod val="75000"/>
+                    <a:lumOff val="25000"/>
+                  </a:schemeClr>
+                </a:solidFill>
+                <a:latin typeface="Times New Roman" panose="02020603050405020304" pitchFamily="18" charset="0"/>
+                <a:cs typeface="Times New Roman" panose="02020603050405020304" pitchFamily="18" charset="0"/>
+              </a:rPr>
+              <a:t>Guibor Camargo</a:t>
+            </a:r>
+          </a:p>
+        </p:txBody>
+      </p:sp>
+      <p:sp>
+        <p:nvSpPr>
+          <p:cNvPr id="7" name="TextBox 6">
+            <a:extLst>
+              <a:ext uri="{FF2B5EF4-FFF2-40B4-BE49-F238E27FC236}">
+                <a16:creationId xmlns:a16="http://schemas.microsoft.com/office/drawing/2014/main" id="{B9BE923A-F592-7B69-014B-CB7FDEB92FBB}"/>
+              </a:ext>
+            </a:extLst>
+          </p:cNvPr>
+          <p:cNvSpPr txBox="1"/>
+          <p:nvPr/>
+        </p:nvSpPr>
+        <p:spPr>
+          <a:xfrm>
+            <a:off x="6659135" y="728161"/>
+            <a:ext cx="4395440" cy="461665"/>
+          </a:xfrm>
+          <a:prstGeom prst="rect">
+            <a:avLst/>
+          </a:prstGeom>
+          <a:noFill/>
+        </p:spPr>
+        <p:txBody>
+          <a:bodyPr wrap="square" rtlCol="0">
+            <a:spAutoFit/>
+          </a:bodyPr>
+          <a:lstStyle/>
+          <a:p>
+            <a:pPr algn="ctr"/>
+            <a:r>
+              <a:rPr lang="en-US" sz="800" b="1" dirty="0">
+                <a:latin typeface="Times New Roman" panose="02020603050405020304" pitchFamily="18" charset="0"/>
+                <a:cs typeface="Times New Roman" panose="02020603050405020304" pitchFamily="18" charset="0"/>
+              </a:rPr>
+              <a:t>R2: </a:t>
+            </a:r>
+          </a:p>
+          <a:p>
+            <a:pPr algn="ctr"/>
+            <a:r>
+              <a:rPr lang="en-US" sz="800" dirty="0">
+                <a:latin typeface="Times New Roman" panose="02020603050405020304" pitchFamily="18" charset="0"/>
+                <a:cs typeface="Times New Roman" panose="02020603050405020304" pitchFamily="18" charset="0"/>
+              </a:rPr>
+              <a:t>- Unconditional estimation</a:t>
+            </a:r>
+          </a:p>
+          <a:p>
+            <a:pPr algn="ctr"/>
+            <a:r>
+              <a:rPr lang="en-US" sz="800" dirty="0">
+                <a:latin typeface="Times New Roman" panose="02020603050405020304" pitchFamily="18" charset="0"/>
+                <a:cs typeface="Times New Roman" panose="02020603050405020304" pitchFamily="18" charset="0"/>
+              </a:rPr>
+              <a:t>- Only pure controls (</a:t>
+            </a:r>
+            <a:r>
+              <a:rPr lang="en-US" sz="800" i="1" dirty="0">
+                <a:latin typeface="Times New Roman" panose="02020603050405020304" pitchFamily="18" charset="0"/>
+                <a:cs typeface="Times New Roman" panose="02020603050405020304" pitchFamily="18" charset="0"/>
+              </a:rPr>
+              <a:t>outsiders</a:t>
+            </a:r>
+            <a:r>
+              <a:rPr lang="en-US" sz="800" dirty="0">
+                <a:latin typeface="Times New Roman" panose="02020603050405020304" pitchFamily="18" charset="0"/>
+                <a:cs typeface="Times New Roman" panose="02020603050405020304" pitchFamily="18" charset="0"/>
+              </a:rPr>
+              <a:t>) and always monitored units</a:t>
+            </a:r>
+            <a:endParaRPr lang="en-US" sz="300" dirty="0">
+              <a:latin typeface="Times New Roman" panose="02020603050405020304" pitchFamily="18" charset="0"/>
+              <a:cs typeface="Times New Roman" panose="02020603050405020304" pitchFamily="18" charset="0"/>
+            </a:endParaRPr>
+          </a:p>
+        </p:txBody>
+      </p:sp>
+      <p:pic>
+        <p:nvPicPr>
+          <p:cNvPr id="3" name="Picture 2" descr="Chart&#10;&#10;Description automatically generated">
+            <a:extLst>
+              <a:ext uri="{FF2B5EF4-FFF2-40B4-BE49-F238E27FC236}">
+                <a16:creationId xmlns:a16="http://schemas.microsoft.com/office/drawing/2014/main" id="{B4CAA7DB-E459-84FC-ADA2-B4ABB666CAFF}"/>
+              </a:ext>
+            </a:extLst>
+          </p:cNvPr>
+          <p:cNvPicPr>
+            <a:picLocks noChangeAspect="1"/>
+          </p:cNvPicPr>
+          <p:nvPr/>
+        </p:nvPicPr>
+        <p:blipFill>
+          <a:blip r:embed="rId4">
+            <a:extLst>
+              <a:ext uri="{28A0092B-C50C-407E-A947-70E740481C1C}">
+                <a14:useLocalDpi xmlns:a14="http://schemas.microsoft.com/office/drawing/2010/main" val="0"/>
+              </a:ext>
+            </a:extLst>
+          </a:blip>
+          <a:stretch>
+            <a:fillRect/>
+          </a:stretch>
+        </p:blipFill>
+        <p:spPr>
+          <a:xfrm>
+            <a:off x="6451217" y="1243484"/>
+            <a:ext cx="4811276" cy="4746099"/>
+          </a:xfrm>
+          <a:prstGeom prst="rect">
+            <a:avLst/>
+          </a:prstGeom>
+        </p:spPr>
+      </p:pic>
+      <p:sp>
+        <p:nvSpPr>
+          <p:cNvPr id="4" name="TextBox 3">
+            <a:extLst>
+              <a:ext uri="{FF2B5EF4-FFF2-40B4-BE49-F238E27FC236}">
+                <a16:creationId xmlns:a16="http://schemas.microsoft.com/office/drawing/2014/main" id="{2A21B023-C359-DC9C-821E-C64A92211F40}"/>
+              </a:ext>
+            </a:extLst>
+          </p:cNvPr>
+          <p:cNvSpPr txBox="1"/>
+          <p:nvPr/>
+        </p:nvSpPr>
+        <p:spPr>
+          <a:xfrm>
+            <a:off x="942515" y="728161"/>
+            <a:ext cx="4395440" cy="461665"/>
+          </a:xfrm>
+          <a:prstGeom prst="rect">
+            <a:avLst/>
+          </a:prstGeom>
+          <a:noFill/>
+        </p:spPr>
+        <p:txBody>
+          <a:bodyPr wrap="square" rtlCol="0">
+            <a:spAutoFit/>
+          </a:bodyPr>
+          <a:lstStyle/>
+          <a:p>
+            <a:pPr algn="ctr"/>
+            <a:r>
+              <a:rPr lang="en-US" sz="800" b="1" dirty="0">
+                <a:latin typeface="Times New Roman" panose="02020603050405020304" pitchFamily="18" charset="0"/>
+                <a:cs typeface="Times New Roman" panose="02020603050405020304" pitchFamily="18" charset="0"/>
+              </a:rPr>
+              <a:t>R1: </a:t>
+            </a:r>
+          </a:p>
+          <a:p>
+            <a:pPr algn="ctr"/>
+            <a:r>
+              <a:rPr lang="en-US" sz="800" dirty="0">
+                <a:latin typeface="Times New Roman" panose="02020603050405020304" pitchFamily="18" charset="0"/>
+                <a:cs typeface="Times New Roman" panose="02020603050405020304" pitchFamily="18" charset="0"/>
+              </a:rPr>
+              <a:t>- Unconditional estimation</a:t>
+            </a:r>
+          </a:p>
+          <a:p>
+            <a:pPr algn="ctr"/>
+            <a:r>
+              <a:rPr lang="en-US" sz="800" dirty="0">
+                <a:latin typeface="Times New Roman" panose="02020603050405020304" pitchFamily="18" charset="0"/>
+                <a:cs typeface="Times New Roman" panose="02020603050405020304" pitchFamily="18" charset="0"/>
+              </a:rPr>
+              <a:t>- All controls and always monitored units</a:t>
+            </a:r>
+            <a:endParaRPr lang="en-US" sz="300" dirty="0">
+              <a:latin typeface="Times New Roman" panose="02020603050405020304" pitchFamily="18" charset="0"/>
+              <a:cs typeface="Times New Roman" panose="02020603050405020304" pitchFamily="18" charset="0"/>
+            </a:endParaRPr>
+          </a:p>
+        </p:txBody>
+      </p:sp>
+      <p:pic>
+        <p:nvPicPr>
+          <p:cNvPr id="11" name="Picture 10" descr="Chart&#10;&#10;Description automatically generated">
+            <a:extLst>
+              <a:ext uri="{FF2B5EF4-FFF2-40B4-BE49-F238E27FC236}">
+                <a16:creationId xmlns:a16="http://schemas.microsoft.com/office/drawing/2014/main" id="{8245670D-12FF-DF45-0BBB-9E6EF9B454ED}"/>
+              </a:ext>
+            </a:extLst>
+          </p:cNvPr>
+          <p:cNvPicPr>
+            <a:picLocks noChangeAspect="1"/>
+          </p:cNvPicPr>
+          <p:nvPr/>
+        </p:nvPicPr>
+        <p:blipFill>
+          <a:blip r:embed="rId5">
+            <a:extLst>
+              <a:ext uri="{28A0092B-C50C-407E-A947-70E740481C1C}">
+                <a14:useLocalDpi xmlns:a14="http://schemas.microsoft.com/office/drawing/2010/main" val="0"/>
+              </a:ext>
+            </a:extLst>
+          </a:blip>
+          <a:stretch>
+            <a:fillRect/>
+          </a:stretch>
+        </p:blipFill>
+        <p:spPr>
+          <a:xfrm>
+            <a:off x="795691" y="1243483"/>
+            <a:ext cx="4811277" cy="4746100"/>
+          </a:xfrm>
+          <a:prstGeom prst="rect">
+            <a:avLst/>
+          </a:prstGeom>
+        </p:spPr>
+      </p:pic>
+    </p:spTree>
+    <p:extLst>
+      <p:ext uri="{BB962C8B-B14F-4D97-AF65-F5344CB8AC3E}">
+        <p14:creationId xmlns:p14="http://schemas.microsoft.com/office/powerpoint/2010/main" val="3685331164"/>
+      </p:ext>
+    </p:extLst>
+  </p:cSld>
+  <p:clrMapOvr>
+    <a:masterClrMapping/>
+  </p:clrMapOvr>
+</p:sld>
+</file>
+
+<file path=ppt/slides/slide17.xml><?xml version="1.0" encoding="utf-8"?>
+<p:sld xmlns:a="http://schemas.openxmlformats.org/drawingml/2006/main" xmlns:r="http://schemas.openxmlformats.org/officeDocument/2006/relationships" xmlns:p="http://schemas.openxmlformats.org/presentationml/2006/main" show="0">
+  <p:cSld>
+    <p:spTree>
+      <p:nvGrpSpPr>
+        <p:cNvPr id="1" name=""/>
+        <p:cNvGrpSpPr/>
+        <p:nvPr/>
+      </p:nvGrpSpPr>
+      <p:grpSpPr>
+        <a:xfrm>
+          <a:off x="0" y="0"/>
+          <a:ext cx="0" cy="0"/>
+          <a:chOff x="0" y="0"/>
+          <a:chExt cx="0" cy="0"/>
+        </a:xfrm>
+      </p:grpSpPr>
+      <p:pic>
+        <p:nvPicPr>
+          <p:cNvPr id="18" name="Picture 17">
+            <a:extLst>
+              <a:ext uri="{FF2B5EF4-FFF2-40B4-BE49-F238E27FC236}">
+                <a16:creationId xmlns:a16="http://schemas.microsoft.com/office/drawing/2014/main" id="{755F0031-30C0-36D6-4A37-9B689C30C53A}"/>
+              </a:ext>
+            </a:extLst>
+          </p:cNvPr>
+          <p:cNvPicPr>
+            <a:picLocks noChangeAspect="1"/>
+          </p:cNvPicPr>
+          <p:nvPr/>
+        </p:nvPicPr>
+        <p:blipFill rotWithShape="1">
+          <a:blip r:embed="rId2">
+            <a:extLst>
+              <a:ext uri="{BEBA8EAE-BF5A-486C-A8C5-ECC9F3942E4B}">
+                <a14:imgProps xmlns:a14="http://schemas.microsoft.com/office/drawing/2010/main">
+                  <a14:imgLayer r:embed="rId3">
+                    <a14:imgEffect>
+                      <a14:brightnessContrast contrast="-20000"/>
+                    </a14:imgEffect>
+                  </a14:imgLayer>
+                </a14:imgProps>
+              </a:ext>
+            </a:extLst>
+          </a:blip>
+          <a:srcRect t="50147" b="2767"/>
+          <a:stretch/>
+        </p:blipFill>
+        <p:spPr>
+          <a:xfrm>
+            <a:off x="0" y="6385560"/>
+            <a:ext cx="12192000" cy="472440"/>
+          </a:xfrm>
+          <a:prstGeom prst="rect">
+            <a:avLst/>
+          </a:prstGeom>
+        </p:spPr>
+      </p:pic>
+      <p:sp>
+        <p:nvSpPr>
+          <p:cNvPr id="20" name="Footer Placeholder 19">
+            <a:extLst>
+              <a:ext uri="{FF2B5EF4-FFF2-40B4-BE49-F238E27FC236}">
+                <a16:creationId xmlns:a16="http://schemas.microsoft.com/office/drawing/2014/main" id="{16C6EE1C-B4C5-63DB-FDD9-2E5174F14162}"/>
+              </a:ext>
+            </a:extLst>
+          </p:cNvPr>
+          <p:cNvSpPr>
+            <a:spLocks noGrp="1"/>
+          </p:cNvSpPr>
+          <p:nvPr>
+            <p:ph type="ftr" sz="quarter" idx="11"/>
+          </p:nvPr>
+        </p:nvSpPr>
+        <p:spPr>
+          <a:xfrm>
+            <a:off x="9845040" y="6425931"/>
+            <a:ext cx="2092960" cy="365125"/>
+          </a:xfrm>
+        </p:spPr>
+        <p:txBody>
+          <a:bodyPr/>
+          <a:lstStyle/>
+          <a:p>
+            <a:pPr algn="r"/>
+            <a:r>
+              <a:rPr lang="en-US" sz="800" dirty="0">
+                <a:solidFill>
+                  <a:schemeClr val="tx1">
+                    <a:lumMod val="75000"/>
+                    <a:lumOff val="25000"/>
+                  </a:schemeClr>
+                </a:solidFill>
+                <a:latin typeface="Times New Roman" panose="02020603050405020304" pitchFamily="18" charset="0"/>
+                <a:cs typeface="Times New Roman" panose="02020603050405020304" pitchFamily="18" charset="0"/>
+              </a:rPr>
+              <a:t>The effect of neighborhood legalization on Bogotá’s informal growth</a:t>
+            </a:r>
+          </a:p>
+        </p:txBody>
+      </p:sp>
+      <p:sp>
+        <p:nvSpPr>
+          <p:cNvPr id="21" name="Slide Number Placeholder 20">
+            <a:extLst>
+              <a:ext uri="{FF2B5EF4-FFF2-40B4-BE49-F238E27FC236}">
+                <a16:creationId xmlns:a16="http://schemas.microsoft.com/office/drawing/2014/main" id="{43B8C7C9-117E-9253-C187-A3DE4A68EB5E}"/>
+              </a:ext>
+            </a:extLst>
+          </p:cNvPr>
+          <p:cNvSpPr>
+            <a:spLocks noGrp="1"/>
+          </p:cNvSpPr>
+          <p:nvPr>
+            <p:ph type="sldNum" sz="quarter" idx="12"/>
+          </p:nvPr>
+        </p:nvSpPr>
+        <p:spPr>
+          <a:xfrm>
+            <a:off x="11805920" y="6425932"/>
+            <a:ext cx="386080" cy="365125"/>
+          </a:xfrm>
+        </p:spPr>
+        <p:txBody>
+          <a:bodyPr/>
+          <a:lstStyle/>
+          <a:p>
+            <a:fld id="{2A4C3AE7-3FF8-4E88-8B99-ADBFDD32DDE0}" type="slidenum">
+              <a:rPr lang="en-US" b="1" smtClean="0">
+                <a:solidFill>
+                  <a:schemeClr val="tx1">
+                    <a:lumMod val="65000"/>
+                    <a:lumOff val="35000"/>
+                  </a:schemeClr>
+                </a:solidFill>
+                <a:latin typeface="Times New Roman" panose="02020603050405020304" pitchFamily="18" charset="0"/>
+                <a:cs typeface="Times New Roman" panose="02020603050405020304" pitchFamily="18" charset="0"/>
+              </a:rPr>
+              <a:t>17</a:t>
             </a:fld>
             <a:endParaRPr lang="en-US" b="1" dirty="0">
               <a:solidFill>
@@ -20464,8 +22998,8 @@
 </p:sld>
 </file>
 
-<file path=ppt/slides/slide14.xml><?xml version="1.0" encoding="utf-8"?>
-<p:sld xmlns:a="http://schemas.openxmlformats.org/drawingml/2006/main" xmlns:r="http://schemas.openxmlformats.org/officeDocument/2006/relationships" xmlns:p="http://schemas.openxmlformats.org/presentationml/2006/main">
+<file path=ppt/slides/slide18.xml><?xml version="1.0" encoding="utf-8"?>
+<p:sld xmlns:a="http://schemas.openxmlformats.org/drawingml/2006/main" xmlns:r="http://schemas.openxmlformats.org/officeDocument/2006/relationships" xmlns:p="http://schemas.openxmlformats.org/presentationml/2006/main" show="0">
   <p:cSld>
     <p:spTree>
       <p:nvGrpSpPr>
@@ -20602,7 +23136,7 @@
                 <a:latin typeface="Times New Roman" panose="02020603050405020304" pitchFamily="18" charset="0"/>
                 <a:cs typeface="Times New Roman" panose="02020603050405020304" pitchFamily="18" charset="0"/>
               </a:rPr>
-              <a:t>14</a:t>
+              <a:t>18</a:t>
             </a:fld>
             <a:endParaRPr lang="en-US" b="1" dirty="0">
               <a:solidFill>
@@ -31713,423 +34247,8 @@
 </p:sld>
 </file>
 
-<file path=ppt/slides/slide15.xml><?xml version="1.0" encoding="utf-8"?>
-<p:sld xmlns:a="http://schemas.openxmlformats.org/drawingml/2006/main" xmlns:r="http://schemas.openxmlformats.org/officeDocument/2006/relationships" xmlns:p="http://schemas.openxmlformats.org/presentationml/2006/main">
-  <p:cSld>
-    <p:spTree>
-      <p:nvGrpSpPr>
-        <p:cNvPr id="1" name=""/>
-        <p:cNvGrpSpPr/>
-        <p:nvPr/>
-      </p:nvGrpSpPr>
-      <p:grpSpPr>
-        <a:xfrm>
-          <a:off x="0" y="0"/>
-          <a:ext cx="0" cy="0"/>
-          <a:chOff x="0" y="0"/>
-          <a:chExt cx="0" cy="0"/>
-        </a:xfrm>
-      </p:grpSpPr>
-      <p:pic>
-        <p:nvPicPr>
-          <p:cNvPr id="18" name="Picture 17">
-            <a:extLst>
-              <a:ext uri="{FF2B5EF4-FFF2-40B4-BE49-F238E27FC236}">
-                <a16:creationId xmlns:a16="http://schemas.microsoft.com/office/drawing/2014/main" id="{755F0031-30C0-36D6-4A37-9B689C30C53A}"/>
-              </a:ext>
-            </a:extLst>
-          </p:cNvPr>
-          <p:cNvPicPr>
-            <a:picLocks noChangeAspect="1"/>
-          </p:cNvPicPr>
-          <p:nvPr/>
-        </p:nvPicPr>
-        <p:blipFill rotWithShape="1">
-          <a:blip r:embed="rId2">
-            <a:extLst>
-              <a:ext uri="{BEBA8EAE-BF5A-486C-A8C5-ECC9F3942E4B}">
-                <a14:imgProps xmlns:a14="http://schemas.microsoft.com/office/drawing/2010/main">
-                  <a14:imgLayer r:embed="rId3">
-                    <a14:imgEffect>
-                      <a14:brightnessContrast contrast="-20000"/>
-                    </a14:imgEffect>
-                  </a14:imgLayer>
-                </a14:imgProps>
-              </a:ext>
-            </a:extLst>
-          </a:blip>
-          <a:srcRect t="50147" b="2767"/>
-          <a:stretch/>
-        </p:blipFill>
-        <p:spPr>
-          <a:xfrm>
-            <a:off x="0" y="6385560"/>
-            <a:ext cx="12192000" cy="472440"/>
-          </a:xfrm>
-          <a:prstGeom prst="rect">
-            <a:avLst/>
-          </a:prstGeom>
-        </p:spPr>
-      </p:pic>
-      <p:sp>
-        <p:nvSpPr>
-          <p:cNvPr id="20" name="Footer Placeholder 19">
-            <a:extLst>
-              <a:ext uri="{FF2B5EF4-FFF2-40B4-BE49-F238E27FC236}">
-                <a16:creationId xmlns:a16="http://schemas.microsoft.com/office/drawing/2014/main" id="{16C6EE1C-B4C5-63DB-FDD9-2E5174F14162}"/>
-              </a:ext>
-            </a:extLst>
-          </p:cNvPr>
-          <p:cNvSpPr>
-            <a:spLocks noGrp="1"/>
-          </p:cNvSpPr>
-          <p:nvPr>
-            <p:ph type="ftr" sz="quarter" idx="11"/>
-          </p:nvPr>
-        </p:nvSpPr>
-        <p:spPr>
-          <a:xfrm>
-            <a:off x="9845040" y="6425931"/>
-            <a:ext cx="2092960" cy="365125"/>
-          </a:xfrm>
-        </p:spPr>
-        <p:txBody>
-          <a:bodyPr/>
-          <a:lstStyle/>
-          <a:p>
-            <a:pPr algn="r"/>
-            <a:r>
-              <a:rPr lang="en-US" sz="800" dirty="0">
-                <a:solidFill>
-                  <a:schemeClr val="tx1">
-                    <a:lumMod val="75000"/>
-                    <a:lumOff val="25000"/>
-                  </a:schemeClr>
-                </a:solidFill>
-                <a:latin typeface="Times New Roman" panose="02020603050405020304" pitchFamily="18" charset="0"/>
-                <a:cs typeface="Times New Roman" panose="02020603050405020304" pitchFamily="18" charset="0"/>
-              </a:rPr>
-              <a:t>The effect of neighborhood legalization on Bogotá’s informal growth</a:t>
-            </a:r>
-          </a:p>
-        </p:txBody>
-      </p:sp>
-      <p:sp>
-        <p:nvSpPr>
-          <p:cNvPr id="21" name="Slide Number Placeholder 20">
-            <a:extLst>
-              <a:ext uri="{FF2B5EF4-FFF2-40B4-BE49-F238E27FC236}">
-                <a16:creationId xmlns:a16="http://schemas.microsoft.com/office/drawing/2014/main" id="{43B8C7C9-117E-9253-C187-A3DE4A68EB5E}"/>
-              </a:ext>
-            </a:extLst>
-          </p:cNvPr>
-          <p:cNvSpPr>
-            <a:spLocks noGrp="1"/>
-          </p:cNvSpPr>
-          <p:nvPr>
-            <p:ph type="sldNum" sz="quarter" idx="12"/>
-          </p:nvPr>
-        </p:nvSpPr>
-        <p:spPr>
-          <a:xfrm>
-            <a:off x="11805920" y="6425932"/>
-            <a:ext cx="386080" cy="365125"/>
-          </a:xfrm>
-        </p:spPr>
-        <p:txBody>
-          <a:bodyPr/>
-          <a:lstStyle/>
-          <a:p>
-            <a:fld id="{2A4C3AE7-3FF8-4E88-8B99-ADBFDD32DDE0}" type="slidenum">
-              <a:rPr lang="en-US" b="1" smtClean="0">
-                <a:solidFill>
-                  <a:schemeClr val="tx1">
-                    <a:lumMod val="65000"/>
-                    <a:lumOff val="35000"/>
-                  </a:schemeClr>
-                </a:solidFill>
-                <a:latin typeface="Times New Roman" panose="02020603050405020304" pitchFamily="18" charset="0"/>
-                <a:cs typeface="Times New Roman" panose="02020603050405020304" pitchFamily="18" charset="0"/>
-              </a:rPr>
-              <a:t>15</a:t>
-            </a:fld>
-            <a:endParaRPr lang="en-US" b="1" dirty="0">
-              <a:solidFill>
-                <a:schemeClr val="tx1">
-                  <a:lumMod val="65000"/>
-                  <a:lumOff val="35000"/>
-                </a:schemeClr>
-              </a:solidFill>
-              <a:latin typeface="Times New Roman" panose="02020603050405020304" pitchFamily="18" charset="0"/>
-              <a:cs typeface="Times New Roman" panose="02020603050405020304" pitchFamily="18" charset="0"/>
-            </a:endParaRPr>
-          </a:p>
-        </p:txBody>
-      </p:sp>
-      <p:cxnSp>
-        <p:nvCxnSpPr>
-          <p:cNvPr id="24" name="Straight Connector 23">
-            <a:extLst>
-              <a:ext uri="{FF2B5EF4-FFF2-40B4-BE49-F238E27FC236}">
-                <a16:creationId xmlns:a16="http://schemas.microsoft.com/office/drawing/2014/main" id="{54F913B5-02C0-0E8C-67FD-C40042FE88B1}"/>
-              </a:ext>
-            </a:extLst>
-          </p:cNvPr>
-          <p:cNvCxnSpPr/>
-          <p:nvPr/>
-        </p:nvCxnSpPr>
-        <p:spPr>
-          <a:xfrm>
-            <a:off x="0" y="328990"/>
-            <a:ext cx="3759200" cy="0"/>
-          </a:xfrm>
-          <a:prstGeom prst="line">
-            <a:avLst/>
-          </a:prstGeom>
-          <a:ln>
-            <a:solidFill>
-              <a:schemeClr val="tx1">
-                <a:lumMod val="50000"/>
-                <a:lumOff val="50000"/>
-              </a:schemeClr>
-            </a:solidFill>
-          </a:ln>
-        </p:spPr>
-        <p:style>
-          <a:lnRef idx="1">
-            <a:schemeClr val="accent1"/>
-          </a:lnRef>
-          <a:fillRef idx="0">
-            <a:schemeClr val="accent1"/>
-          </a:fillRef>
-          <a:effectRef idx="0">
-            <a:schemeClr val="accent1"/>
-          </a:effectRef>
-          <a:fontRef idx="minor">
-            <a:schemeClr val="tx1"/>
-          </a:fontRef>
-        </p:style>
-      </p:cxnSp>
-      <p:sp>
-        <p:nvSpPr>
-          <p:cNvPr id="26" name="TextBox 25">
-            <a:extLst>
-              <a:ext uri="{FF2B5EF4-FFF2-40B4-BE49-F238E27FC236}">
-                <a16:creationId xmlns:a16="http://schemas.microsoft.com/office/drawing/2014/main" id="{0980D4F8-F9A4-5B77-F1B2-5F98FF6D54DC}"/>
-              </a:ext>
-            </a:extLst>
-          </p:cNvPr>
-          <p:cNvSpPr txBox="1"/>
-          <p:nvPr/>
-        </p:nvSpPr>
-        <p:spPr>
-          <a:xfrm>
-            <a:off x="-35560" y="-60960"/>
-            <a:ext cx="2844800" cy="461665"/>
-          </a:xfrm>
-          <a:prstGeom prst="rect">
-            <a:avLst/>
-          </a:prstGeom>
-          <a:noFill/>
-        </p:spPr>
-        <p:txBody>
-          <a:bodyPr wrap="square" rtlCol="0">
-            <a:spAutoFit/>
-          </a:bodyPr>
-          <a:lstStyle/>
-          <a:p>
-            <a:r>
-              <a:rPr lang="en-US" sz="2400" dirty="0">
-                <a:latin typeface="Times New Roman" panose="02020603050405020304" pitchFamily="18" charset="0"/>
-                <a:cs typeface="Times New Roman" panose="02020603050405020304" pitchFamily="18" charset="0"/>
-              </a:rPr>
-              <a:t>R</a:t>
-            </a:r>
-            <a:r>
-              <a:rPr lang="en-US" sz="1600" dirty="0">
-                <a:latin typeface="Times New Roman" panose="02020603050405020304" pitchFamily="18" charset="0"/>
-                <a:cs typeface="Times New Roman" panose="02020603050405020304" pitchFamily="18" charset="0"/>
-              </a:rPr>
-              <a:t>esults</a:t>
-            </a:r>
-            <a:endParaRPr lang="en-US" sz="1000" dirty="0">
-              <a:latin typeface="Times New Roman" panose="02020603050405020304" pitchFamily="18" charset="0"/>
-              <a:cs typeface="Times New Roman" panose="02020603050405020304" pitchFamily="18" charset="0"/>
-            </a:endParaRPr>
-          </a:p>
-        </p:txBody>
-      </p:sp>
-      <p:sp>
-        <p:nvSpPr>
-          <p:cNvPr id="27" name="Footer Placeholder 19">
-            <a:extLst>
-              <a:ext uri="{FF2B5EF4-FFF2-40B4-BE49-F238E27FC236}">
-                <a16:creationId xmlns:a16="http://schemas.microsoft.com/office/drawing/2014/main" id="{E56119E7-DDAB-699C-01DB-261EAC7CC30A}"/>
-              </a:ext>
-            </a:extLst>
-          </p:cNvPr>
-          <p:cNvSpPr txBox="1">
-            <a:spLocks/>
-          </p:cNvSpPr>
-          <p:nvPr/>
-        </p:nvSpPr>
-        <p:spPr>
-          <a:xfrm>
-            <a:off x="0" y="6439217"/>
-            <a:ext cx="2316480" cy="365125"/>
-          </a:xfrm>
-          <a:prstGeom prst="rect">
-            <a:avLst/>
-          </a:prstGeom>
-        </p:spPr>
-        <p:txBody>
-          <a:bodyPr vert="horz" lIns="91440" tIns="45720" rIns="91440" bIns="45720" rtlCol="0" anchor="ctr"/>
-          <a:lstStyle>
-            <a:defPPr>
-              <a:defRPr lang="en-US"/>
-            </a:defPPr>
-            <a:lvl1pPr marL="0" algn="ctr" defTabSz="914400" rtl="0" eaLnBrk="1" latinLnBrk="0" hangingPunct="1">
-              <a:defRPr sz="1200" kern="1200">
-                <a:solidFill>
-                  <a:schemeClr val="tx1">
-                    <a:tint val="75000"/>
-                  </a:schemeClr>
-                </a:solidFill>
-                <a:latin typeface="+mn-lt"/>
-                <a:ea typeface="+mn-ea"/>
-                <a:cs typeface="+mn-cs"/>
-              </a:defRPr>
-            </a:lvl1pPr>
-            <a:lvl2pPr marL="457200" algn="l" defTabSz="914400" rtl="0" eaLnBrk="1" latinLnBrk="0" hangingPunct="1">
-              <a:defRPr sz="1800" kern="1200">
-                <a:solidFill>
-                  <a:schemeClr val="tx1"/>
-                </a:solidFill>
-                <a:latin typeface="+mn-lt"/>
-                <a:ea typeface="+mn-ea"/>
-                <a:cs typeface="+mn-cs"/>
-              </a:defRPr>
-            </a:lvl2pPr>
-            <a:lvl3pPr marL="914400" algn="l" defTabSz="914400" rtl="0" eaLnBrk="1" latinLnBrk="0" hangingPunct="1">
-              <a:defRPr sz="1800" kern="1200">
-                <a:solidFill>
-                  <a:schemeClr val="tx1"/>
-                </a:solidFill>
-                <a:latin typeface="+mn-lt"/>
-                <a:ea typeface="+mn-ea"/>
-                <a:cs typeface="+mn-cs"/>
-              </a:defRPr>
-            </a:lvl3pPr>
-            <a:lvl4pPr marL="1371600" algn="l" defTabSz="914400" rtl="0" eaLnBrk="1" latinLnBrk="0" hangingPunct="1">
-              <a:defRPr sz="1800" kern="1200">
-                <a:solidFill>
-                  <a:schemeClr val="tx1"/>
-                </a:solidFill>
-                <a:latin typeface="+mn-lt"/>
-                <a:ea typeface="+mn-ea"/>
-                <a:cs typeface="+mn-cs"/>
-              </a:defRPr>
-            </a:lvl4pPr>
-            <a:lvl5pPr marL="1828800" algn="l" defTabSz="914400" rtl="0" eaLnBrk="1" latinLnBrk="0" hangingPunct="1">
-              <a:defRPr sz="1800" kern="1200">
-                <a:solidFill>
-                  <a:schemeClr val="tx1"/>
-                </a:solidFill>
-                <a:latin typeface="+mn-lt"/>
-                <a:ea typeface="+mn-ea"/>
-                <a:cs typeface="+mn-cs"/>
-              </a:defRPr>
-            </a:lvl5pPr>
-            <a:lvl6pPr marL="2286000" algn="l" defTabSz="914400" rtl="0" eaLnBrk="1" latinLnBrk="0" hangingPunct="1">
-              <a:defRPr sz="1800" kern="1200">
-                <a:solidFill>
-                  <a:schemeClr val="tx1"/>
-                </a:solidFill>
-                <a:latin typeface="+mn-lt"/>
-                <a:ea typeface="+mn-ea"/>
-                <a:cs typeface="+mn-cs"/>
-              </a:defRPr>
-            </a:lvl6pPr>
-            <a:lvl7pPr marL="2743200" algn="l" defTabSz="914400" rtl="0" eaLnBrk="1" latinLnBrk="0" hangingPunct="1">
-              <a:defRPr sz="1800" kern="1200">
-                <a:solidFill>
-                  <a:schemeClr val="tx1"/>
-                </a:solidFill>
-                <a:latin typeface="+mn-lt"/>
-                <a:ea typeface="+mn-ea"/>
-                <a:cs typeface="+mn-cs"/>
-              </a:defRPr>
-            </a:lvl7pPr>
-            <a:lvl8pPr marL="3200400" algn="l" defTabSz="914400" rtl="0" eaLnBrk="1" latinLnBrk="0" hangingPunct="1">
-              <a:defRPr sz="1800" kern="1200">
-                <a:solidFill>
-                  <a:schemeClr val="tx1"/>
-                </a:solidFill>
-                <a:latin typeface="+mn-lt"/>
-                <a:ea typeface="+mn-ea"/>
-                <a:cs typeface="+mn-cs"/>
-              </a:defRPr>
-            </a:lvl8pPr>
-            <a:lvl9pPr marL="3657600" algn="l" defTabSz="914400" rtl="0" eaLnBrk="1" latinLnBrk="0" hangingPunct="1">
-              <a:defRPr sz="1800" kern="1200">
-                <a:solidFill>
-                  <a:schemeClr val="tx1"/>
-                </a:solidFill>
-                <a:latin typeface="+mn-lt"/>
-                <a:ea typeface="+mn-ea"/>
-                <a:cs typeface="+mn-cs"/>
-              </a:defRPr>
-            </a:lvl9pPr>
-          </a:lstStyle>
-          <a:p>
-            <a:pPr algn="l"/>
-            <a:r>
-              <a:rPr lang="en-US" sz="800" dirty="0">
-                <a:solidFill>
-                  <a:schemeClr val="tx1">
-                    <a:lumMod val="75000"/>
-                    <a:lumOff val="25000"/>
-                  </a:schemeClr>
-                </a:solidFill>
-                <a:latin typeface="Times New Roman" panose="02020603050405020304" pitchFamily="18" charset="0"/>
-                <a:cs typeface="Times New Roman" panose="02020603050405020304" pitchFamily="18" charset="0"/>
-              </a:rPr>
-              <a:t>Universidad del Rosario - Faculty of Economics</a:t>
-            </a:r>
-          </a:p>
-          <a:p>
-            <a:pPr algn="l"/>
-            <a:r>
-              <a:rPr lang="en-US" sz="800" dirty="0">
-                <a:solidFill>
-                  <a:schemeClr val="tx1">
-                    <a:lumMod val="75000"/>
-                    <a:lumOff val="25000"/>
-                  </a:schemeClr>
-                </a:solidFill>
-                <a:latin typeface="Times New Roman" panose="02020603050405020304" pitchFamily="18" charset="0"/>
-                <a:cs typeface="Times New Roman" panose="02020603050405020304" pitchFamily="18" charset="0"/>
-              </a:rPr>
-              <a:t>Guibor Camargo</a:t>
-            </a:r>
-          </a:p>
-        </p:txBody>
-      </p:sp>
-    </p:spTree>
-    <p:extLst>
-      <p:ext uri="{BB962C8B-B14F-4D97-AF65-F5344CB8AC3E}">
-        <p14:creationId xmlns:p14="http://schemas.microsoft.com/office/powerpoint/2010/main" val="3868716963"/>
-      </p:ext>
-    </p:extLst>
-  </p:cSld>
-  <p:clrMapOvr>
-    <a:masterClrMapping/>
-  </p:clrMapOvr>
-</p:sld>
-</file>
-
-<file path=ppt/slides/slide16.xml><?xml version="1.0" encoding="utf-8"?>
-<p:sld xmlns:a="http://schemas.openxmlformats.org/drawingml/2006/main" xmlns:r="http://schemas.openxmlformats.org/officeDocument/2006/relationships" xmlns:p="http://schemas.openxmlformats.org/presentationml/2006/main">
+<file path=ppt/slides/slide19.xml><?xml version="1.0" encoding="utf-8"?>
+<p:sld xmlns:a="http://schemas.openxmlformats.org/drawingml/2006/main" xmlns:r="http://schemas.openxmlformats.org/officeDocument/2006/relationships" xmlns:p="http://schemas.openxmlformats.org/presentationml/2006/main" show="0">
   <p:cSld>
     <p:spTree>
       <p:nvGrpSpPr>

</xml_diff>